<commit_message>
updated korean ESP8266 basic guide document
</commit_message>
<xml_diff>
--- a/ESP8266 Direct Coding.pptx
+++ b/ESP8266 Direct Coding.pptx
@@ -5,20 +5,22 @@
     <p:sldMasterId id="2147483648" r:id="rId1"/>
   </p:sldMasterIdLst>
   <p:notesMasterIdLst>
-    <p:notesMasterId r:id="rId13"/>
+    <p:notesMasterId r:id="rId15"/>
   </p:notesMasterIdLst>
   <p:sldIdLst>
     <p:sldId id="256" r:id="rId2"/>
     <p:sldId id="257" r:id="rId3"/>
     <p:sldId id="259" r:id="rId4"/>
-    <p:sldId id="264" r:id="rId5"/>
-    <p:sldId id="265" r:id="rId6"/>
-    <p:sldId id="258" r:id="rId7"/>
-    <p:sldId id="266" r:id="rId8"/>
-    <p:sldId id="270" r:id="rId9"/>
-    <p:sldId id="263" r:id="rId10"/>
-    <p:sldId id="268" r:id="rId11"/>
-    <p:sldId id="269" r:id="rId12"/>
+    <p:sldId id="272" r:id="rId5"/>
+    <p:sldId id="264" r:id="rId6"/>
+    <p:sldId id="265" r:id="rId7"/>
+    <p:sldId id="258" r:id="rId8"/>
+    <p:sldId id="271" r:id="rId9"/>
+    <p:sldId id="266" r:id="rId10"/>
+    <p:sldId id="270" r:id="rId11"/>
+    <p:sldId id="263" r:id="rId12"/>
+    <p:sldId id="268" r:id="rId13"/>
+    <p:sldId id="269" r:id="rId14"/>
   </p:sldIdLst>
   <p:sldSz cx="9144000" cy="6858000" type="screen4x3"/>
   <p:notesSz cx="6858000" cy="9144000"/>
@@ -3729,6 +3731,13 @@
   <p:clrMapOvr>
     <a:masterClrMapping/>
   </p:clrMapOvr>
+  <p:timing>
+    <p:tnLst>
+      <p:par>
+        <p:cTn id="1" dur="indefinite" restart="never" nodeType="tmRoot"/>
+      </p:par>
+    </p:tnLst>
+  </p:timing>
 </p:sld>
 </file>
 
@@ -3751,30 +3760,7 @@
       </p:grpSpPr>
       <p:sp>
         <p:nvSpPr>
-          <p:cNvPr id="5" name="제목 4"/>
-          <p:cNvSpPr>
-            <a:spLocks noGrp="1"/>
-          </p:cNvSpPr>
-          <p:nvPr>
-            <p:ph type="title"/>
-          </p:nvPr>
-        </p:nvSpPr>
-        <p:spPr/>
-        <p:txBody>
-          <a:bodyPr/>
-          <a:lstStyle/>
-          <a:p>
-            <a:r>
-              <a:rPr lang="ko-KR" altLang="en-US" dirty="0" smtClean="0"/>
-              <a:t>업로드</a:t>
-            </a:r>
-            <a:endParaRPr lang="ko-KR" altLang="en-US" dirty="0"/>
-          </a:p>
-        </p:txBody>
-      </p:sp>
-      <p:sp>
-        <p:nvSpPr>
-          <p:cNvPr id="4" name="슬라이드 번호 개체 틀 3"/>
+          <p:cNvPr id="3" name="슬라이드 번호 개체 틀 2"/>
           <p:cNvSpPr>
             <a:spLocks noGrp="1"/>
           </p:cNvSpPr>
@@ -3792,44 +3778,143 @@
               <a:pPr/>
               <a:t>10</a:t>
             </a:fld>
-            <a:endParaRPr lang="ko-KR" altLang="en-US"/>
-          </a:p>
-        </p:txBody>
-      </p:sp>
-      <p:sp>
-        <p:nvSpPr>
-          <p:cNvPr id="6" name="내용 개체 틀 5"/>
-          <p:cNvSpPr>
-            <a:spLocks noGrp="1"/>
-          </p:cNvSpPr>
-          <p:nvPr>
-            <p:ph idx="1"/>
+            <a:endParaRPr lang="ko-KR" altLang="en-US" dirty="0"/>
+          </a:p>
+        </p:txBody>
+      </p:sp>
+      <p:sp>
+        <p:nvSpPr>
+          <p:cNvPr id="7" name="제목 1"/>
+          <p:cNvSpPr>
+            <a:spLocks noGrp="1"/>
+          </p:cNvSpPr>
+          <p:nvPr>
+            <p:ph type="title"/>
           </p:nvPr>
         </p:nvSpPr>
         <p:spPr>
           <a:xfrm>
-            <a:off x="467544" y="3140968"/>
-            <a:ext cx="8229600" cy="648072"/>
+            <a:off x="4561656" y="274638"/>
+            <a:ext cx="4114800" cy="490066"/>
           </a:xfrm>
         </p:spPr>
         <p:txBody>
-          <a:bodyPr/>
+          <a:bodyPr>
+            <a:normAutofit/>
+          </a:bodyPr>
+          <a:lstStyle/>
+          <a:p>
+            <a:r>
+              <a:rPr lang="en-US" altLang="ko-KR" dirty="0" smtClean="0"/>
+              <a:t>ESP8266</a:t>
+            </a:r>
+            <a:r>
+              <a:rPr lang="ko-KR" altLang="en-US" dirty="0" smtClean="0"/>
+              <a:t>으로 </a:t>
+            </a:r>
+            <a:r>
+              <a:rPr lang="en-US" altLang="ko-KR" dirty="0" smtClean="0"/>
+              <a:t>TCP </a:t>
+            </a:r>
+            <a:r>
+              <a:rPr lang="ko-KR" altLang="en-US" dirty="0" smtClean="0"/>
+              <a:t>서버 만들기</a:t>
+            </a:r>
+            <a:endParaRPr lang="ko-KR" altLang="en-US" dirty="0"/>
+          </a:p>
+        </p:txBody>
+      </p:sp>
+      <p:sp>
+        <p:nvSpPr>
+          <p:cNvPr id="9" name="TextBox 8"/>
+          <p:cNvSpPr txBox="1"/>
+          <p:nvPr/>
+        </p:nvSpPr>
+        <p:spPr>
+          <a:xfrm>
+            <a:off x="2123728" y="4509120"/>
+            <a:ext cx="5040560" cy="369332"/>
+          </a:xfrm>
+          <a:prstGeom prst="rect">
+            <a:avLst/>
+          </a:prstGeom>
+          <a:noFill/>
+        </p:spPr>
+        <p:txBody>
+          <a:bodyPr wrap="square" rtlCol="0">
+            <a:spAutoFit/>
+          </a:bodyPr>
           <a:lstStyle/>
           <a:p>
             <a:pPr algn="ctr"/>
             <a:r>
+              <a:rPr lang="en-US" altLang="ko-KR" dirty="0" smtClean="0"/>
+              <a:t>Make </a:t>
+            </a:r>
+            <a:r>
               <a:rPr lang="ko-KR" altLang="en-US" dirty="0" smtClean="0"/>
-              <a:t>업로드 과정 그림</a:t>
+              <a:t>성공 후 </a:t>
+            </a:r>
+            <a:r>
+              <a:rPr lang="en-US" altLang="ko-KR" dirty="0" smtClean="0"/>
+              <a:t>&amp;</a:t>
+            </a:r>
+            <a:r>
+              <a:rPr lang="ko-KR" altLang="en-US" dirty="0" smtClean="0"/>
+              <a:t> 생성된 </a:t>
+            </a:r>
+            <a:r>
+              <a:rPr lang="en-US" altLang="ko-KR" dirty="0" smtClean="0"/>
+              <a:t>build, firmware </a:t>
+            </a:r>
+            <a:r>
+              <a:rPr lang="ko-KR" altLang="en-US" dirty="0" smtClean="0"/>
+              <a:t>폴더</a:t>
             </a:r>
             <a:endParaRPr lang="ko-KR" altLang="en-US" dirty="0"/>
           </a:p>
         </p:txBody>
       </p:sp>
+      <p:pic>
+        <p:nvPicPr>
+          <p:cNvPr id="4100" name="Picture 4" descr="H:\ESP8266Wifi ModuleSDK\doc\ppt이미지\ESP8266 TCP 서버 만들기\make 성공 화면 &amp; 생성된 build, firmware 폴더.jpg"/>
+          <p:cNvPicPr>
+            <a:picLocks noGrp="1" noChangeAspect="1" noChangeArrowheads="1"/>
+          </p:cNvPicPr>
+          <p:nvPr>
+            <p:ph idx="1"/>
+          </p:nvPr>
+        </p:nvPicPr>
+        <p:blipFill>
+          <a:blip r:embed="rId2" cstate="print"/>
+          <a:srcRect/>
+          <a:stretch>
+            <a:fillRect/>
+          </a:stretch>
+        </p:blipFill>
+        <p:spPr bwMode="auto">
+          <a:xfrm>
+            <a:off x="611560" y="1988840"/>
+            <a:ext cx="8075781" cy="2160240"/>
+          </a:xfrm>
+          <a:prstGeom prst="rect">
+            <a:avLst/>
+          </a:prstGeom>
+          <a:noFill/>
+        </p:spPr>
+      </p:pic>
     </p:spTree>
   </p:cSld>
   <p:clrMapOvr>
     <a:masterClrMapping/>
   </p:clrMapOvr>
+  <p:timing>
+    <p:tnLst>
+      <p:par>
+        <p:cTn id="1" dur="indefinite" restart="never" nodeType="tmRoot"/>
+      </p:par>
+    </p:tnLst>
+  </p:timing>
 </p:sld>
 </file>
 
@@ -3852,7 +3937,472 @@
       </p:grpSpPr>
       <p:sp>
         <p:nvSpPr>
-          <p:cNvPr id="3" name="슬라이드 번호 개체 틀 2"/>
+          <p:cNvPr id="2" name="제목 1"/>
+          <p:cNvSpPr>
+            <a:spLocks noGrp="1"/>
+          </p:cNvSpPr>
+          <p:nvPr>
+            <p:ph type="title"/>
+          </p:nvPr>
+        </p:nvSpPr>
+        <p:spPr/>
+        <p:txBody>
+          <a:bodyPr/>
+          <a:lstStyle/>
+          <a:p>
+            <a:r>
+              <a:rPr lang="en-US" altLang="ko-KR" dirty="0" smtClean="0"/>
+              <a:t>ESP8266</a:t>
+            </a:r>
+            <a:r>
+              <a:rPr lang="ko-KR" altLang="en-US" dirty="0" smtClean="0"/>
+              <a:t>에 업로드</a:t>
+            </a:r>
+            <a:endParaRPr lang="ko-KR" altLang="en-US" dirty="0"/>
+          </a:p>
+        </p:txBody>
+      </p:sp>
+      <p:sp>
+        <p:nvSpPr>
+          <p:cNvPr id="3" name="내용 개체 틀 2"/>
+          <p:cNvSpPr>
+            <a:spLocks noGrp="1"/>
+          </p:cNvSpPr>
+          <p:nvPr>
+            <p:ph idx="1"/>
+          </p:nvPr>
+        </p:nvSpPr>
+        <p:spPr>
+          <a:xfrm>
+            <a:off x="457200" y="1600201"/>
+            <a:ext cx="8229600" cy="4493096"/>
+          </a:xfrm>
+        </p:spPr>
+        <p:txBody>
+          <a:bodyPr>
+            <a:normAutofit lnSpcReduction="10000"/>
+          </a:bodyPr>
+          <a:lstStyle/>
+          <a:p>
+            <a:pPr>
+              <a:buAutoNum type="arabicPeriod"/>
+            </a:pPr>
+            <a:r>
+              <a:rPr lang="en-US" altLang="ko-KR" sz="1800" dirty="0" smtClean="0"/>
+              <a:t>ESP8266</a:t>
+            </a:r>
+            <a:r>
+              <a:rPr lang="ko-KR" altLang="en-US" sz="1800" dirty="0" smtClean="0"/>
+              <a:t>모듈을 개발보드에 장착시킨다</a:t>
+            </a:r>
+            <a:r>
+              <a:rPr lang="en-US" altLang="ko-KR" sz="1800" dirty="0" smtClean="0"/>
+              <a:t>.</a:t>
+            </a:r>
+          </a:p>
+          <a:p>
+            <a:pPr>
+              <a:buAutoNum type="arabicPeriod"/>
+            </a:pPr>
+            <a:r>
+              <a:rPr lang="en-US" altLang="ko-KR" sz="1800" dirty="0" smtClean="0"/>
+              <a:t>GPIO0</a:t>
+            </a:r>
+            <a:r>
+              <a:rPr lang="ko-KR" altLang="en-US" sz="1800" dirty="0" smtClean="0"/>
+              <a:t>을 </a:t>
+            </a:r>
+            <a:r>
+              <a:rPr lang="en-US" altLang="ko-KR" sz="1800" dirty="0" smtClean="0"/>
+              <a:t>GND</a:t>
+            </a:r>
+            <a:r>
+              <a:rPr lang="ko-KR" altLang="en-US" sz="1800" dirty="0" smtClean="0"/>
+              <a:t>에 연결한다</a:t>
+            </a:r>
+            <a:r>
+              <a:rPr lang="en-US" altLang="ko-KR" sz="1800" dirty="0" smtClean="0"/>
+              <a:t>.</a:t>
+            </a:r>
+          </a:p>
+          <a:p>
+            <a:pPr>
+              <a:buAutoNum type="arabicPeriod"/>
+            </a:pPr>
+            <a:r>
+              <a:rPr lang="en-US" altLang="ko-KR" sz="1800" dirty="0" smtClean="0"/>
+              <a:t>ESP-201</a:t>
+            </a:r>
+            <a:r>
+              <a:rPr lang="ko-KR" altLang="en-US" sz="1800" dirty="0" smtClean="0"/>
+              <a:t>개발보드의 전원을 끈다</a:t>
+            </a:r>
+            <a:r>
+              <a:rPr lang="en-US" altLang="ko-KR" sz="1800" dirty="0" smtClean="0"/>
+              <a:t>.</a:t>
+            </a:r>
+          </a:p>
+          <a:p>
+            <a:pPr>
+              <a:buAutoNum type="arabicPeriod"/>
+            </a:pPr>
+            <a:r>
+              <a:rPr lang="en-US" altLang="ko-KR" sz="1800" dirty="0" smtClean="0"/>
+              <a:t>K1 </a:t>
+            </a:r>
+            <a:r>
+              <a:rPr lang="ko-KR" altLang="en-US" sz="1800" dirty="0" err="1" smtClean="0"/>
+              <a:t>딥스위치</a:t>
+            </a:r>
+            <a:r>
+              <a:rPr lang="ko-KR" altLang="en-US" sz="1800" dirty="0" smtClean="0"/>
+              <a:t> 버튼을 </a:t>
+            </a:r>
+            <a:r>
+              <a:rPr lang="en-US" altLang="ko-KR" sz="1800" dirty="0" smtClean="0"/>
+              <a:t>on</a:t>
+            </a:r>
+            <a:r>
+              <a:rPr lang="ko-KR" altLang="en-US" sz="1800" dirty="0" smtClean="0"/>
+              <a:t>하고 개발 보드의 전원을 켠다</a:t>
+            </a:r>
+            <a:r>
+              <a:rPr lang="en-US" altLang="ko-KR" sz="1800" dirty="0" smtClean="0"/>
+              <a:t>.</a:t>
+            </a:r>
+          </a:p>
+          <a:p>
+            <a:pPr>
+              <a:buAutoNum type="arabicPeriod"/>
+            </a:pPr>
+            <a:r>
+              <a:rPr lang="en-US" altLang="ko-KR" sz="1800" dirty="0" smtClean="0"/>
+              <a:t>K1 </a:t>
+            </a:r>
+            <a:r>
+              <a:rPr lang="ko-KR" altLang="en-US" sz="1800" dirty="0" err="1" smtClean="0"/>
+              <a:t>딥스위치</a:t>
+            </a:r>
+            <a:r>
+              <a:rPr lang="ko-KR" altLang="en-US" sz="1800" dirty="0" smtClean="0"/>
+              <a:t> 버튼을 </a:t>
+            </a:r>
+            <a:r>
+              <a:rPr lang="en-US" altLang="ko-KR" sz="1800" dirty="0" smtClean="0"/>
+              <a:t>off</a:t>
+            </a:r>
+            <a:r>
+              <a:rPr lang="ko-KR" altLang="en-US" sz="1800" dirty="0" smtClean="0"/>
+              <a:t>한다</a:t>
+            </a:r>
+            <a:r>
+              <a:rPr lang="en-US" altLang="ko-KR" sz="1800" dirty="0" smtClean="0"/>
+              <a:t>.</a:t>
+            </a:r>
+          </a:p>
+          <a:p>
+            <a:pPr>
+              <a:buAutoNum type="arabicPeriod"/>
+            </a:pPr>
+            <a:r>
+              <a:rPr lang="ko-KR" altLang="en-US" sz="1800" dirty="0" smtClean="0"/>
+              <a:t>아래의 명령어를 이용하여 </a:t>
+            </a:r>
+            <a:r>
+              <a:rPr lang="ko-KR" altLang="en-US" sz="1800" dirty="0" err="1" smtClean="0"/>
+              <a:t>펌웨어를</a:t>
+            </a:r>
+            <a:r>
+              <a:rPr lang="ko-KR" altLang="en-US" sz="1800" dirty="0" smtClean="0"/>
+              <a:t> </a:t>
+            </a:r>
+            <a:r>
+              <a:rPr lang="ko-KR" altLang="en-US" sz="1800" dirty="0" err="1" smtClean="0"/>
+              <a:t>업로드한다</a:t>
+            </a:r>
+            <a:r>
+              <a:rPr lang="en-US" altLang="ko-KR" sz="1800" dirty="0" smtClean="0"/>
+              <a:t>. </a:t>
+            </a:r>
+          </a:p>
+          <a:p>
+            <a:pPr>
+              <a:buNone/>
+            </a:pPr>
+            <a:endParaRPr lang="en-US" altLang="ko-KR" sz="1800" dirty="0" smtClean="0"/>
+          </a:p>
+          <a:p>
+            <a:pPr>
+              <a:buNone/>
+            </a:pPr>
+            <a:r>
+              <a:rPr lang="en-US" altLang="ko-KR" sz="1500" dirty="0" smtClean="0"/>
+              <a:t>#</a:t>
+            </a:r>
+            <a:r>
+              <a:rPr lang="en-US" altLang="ko-KR" sz="1500" dirty="0" smtClean="0"/>
+              <a:t> [</a:t>
+            </a:r>
+            <a:r>
+              <a:rPr lang="en-US" altLang="ko-KR" sz="1500" dirty="0" err="1" smtClean="0"/>
+              <a:t>sudo</a:t>
+            </a:r>
+            <a:r>
+              <a:rPr lang="en-US" altLang="ko-KR" sz="1500" dirty="0" smtClean="0"/>
+              <a:t> /opt/</a:t>
+            </a:r>
+            <a:r>
+              <a:rPr lang="en-US" altLang="ko-KR" sz="1500" dirty="0" err="1" smtClean="0"/>
+              <a:t>Espressif</a:t>
+            </a:r>
+            <a:r>
+              <a:rPr lang="en-US" altLang="ko-KR" sz="1500" dirty="0" smtClean="0"/>
+              <a:t>/</a:t>
+            </a:r>
+            <a:r>
+              <a:rPr lang="en-US" altLang="ko-KR" sz="1500" dirty="0" err="1" smtClean="0"/>
+              <a:t>esptool-py</a:t>
+            </a:r>
+            <a:r>
+              <a:rPr lang="en-US" altLang="ko-KR" sz="1500" dirty="0" smtClean="0"/>
+              <a:t>/esptool.py --port /dev/ttyUSB0 </a:t>
+            </a:r>
+            <a:r>
+              <a:rPr lang="en-US" altLang="ko-KR" sz="1500" dirty="0" err="1" smtClean="0"/>
+              <a:t>write_flash</a:t>
+            </a:r>
+            <a:r>
+              <a:rPr lang="en-US" altLang="ko-KR" sz="1500" dirty="0" smtClean="0"/>
+              <a:t> 0x3C000 /opt/</a:t>
+            </a:r>
+            <a:r>
+              <a:rPr lang="en-US" altLang="ko-KR" sz="1500" dirty="0" err="1" smtClean="0"/>
+              <a:t>Espressif</a:t>
+            </a:r>
+            <a:r>
+              <a:rPr lang="en-US" altLang="ko-KR" sz="1500" dirty="0" smtClean="0"/>
+              <a:t>/ESP8266_SDK/bin/blank.bin 0x00000 /opt/</a:t>
+            </a:r>
+            <a:r>
+              <a:rPr lang="en-US" altLang="ko-KR" sz="1500" dirty="0" err="1" smtClean="0"/>
+              <a:t>Espressif</a:t>
+            </a:r>
+            <a:r>
+              <a:rPr lang="en-US" altLang="ko-KR" sz="1500" dirty="0" smtClean="0"/>
+              <a:t>/ESP8266_SDK/</a:t>
+            </a:r>
+            <a:r>
+              <a:rPr lang="en-US" altLang="ko-KR" sz="1500" dirty="0" err="1" smtClean="0"/>
+              <a:t>shinwook</a:t>
+            </a:r>
+            <a:r>
+              <a:rPr lang="en-US" altLang="ko-KR" sz="1500" dirty="0" smtClean="0"/>
+              <a:t>(</a:t>
+            </a:r>
+            <a:r>
+              <a:rPr lang="ko-KR" altLang="en-US" sz="1500" dirty="0" smtClean="0"/>
+              <a:t>내 작업환경</a:t>
+            </a:r>
+            <a:r>
+              <a:rPr lang="en-US" altLang="ko-KR" sz="1500" dirty="0" smtClean="0"/>
+              <a:t>)/</a:t>
+            </a:r>
+            <a:r>
+              <a:rPr lang="en-US" altLang="ko-KR" sz="1500" dirty="0" err="1" smtClean="0"/>
+              <a:t>wifiex</a:t>
+            </a:r>
+            <a:r>
+              <a:rPr lang="en-US" altLang="ko-KR" sz="1500" dirty="0" smtClean="0"/>
+              <a:t>(</a:t>
+            </a:r>
+            <a:r>
+              <a:rPr lang="ko-KR" altLang="en-US" sz="1500" dirty="0" err="1" smtClean="0"/>
+              <a:t>프로젝트명</a:t>
+            </a:r>
+            <a:r>
+              <a:rPr lang="en-US" altLang="ko-KR" sz="1500" dirty="0" smtClean="0"/>
+              <a:t>)/firmware/0x00000.bin 0x40000 /opt/</a:t>
+            </a:r>
+            <a:r>
+              <a:rPr lang="en-US" altLang="ko-KR" sz="1500" dirty="0" err="1" smtClean="0"/>
+              <a:t>Espressif</a:t>
+            </a:r>
+            <a:r>
+              <a:rPr lang="en-US" altLang="ko-KR" sz="1500" dirty="0" smtClean="0"/>
+              <a:t>/ESP8266_SDK opt/</a:t>
+            </a:r>
+            <a:r>
+              <a:rPr lang="en-US" altLang="ko-KR" sz="1500" dirty="0" err="1" smtClean="0"/>
+              <a:t>Espressif</a:t>
+            </a:r>
+            <a:r>
+              <a:rPr lang="en-US" altLang="ko-KR" sz="1500" dirty="0" smtClean="0"/>
+              <a:t>/ESP8266_SDK/</a:t>
+            </a:r>
+            <a:r>
+              <a:rPr lang="en-US" altLang="ko-KR" sz="1500" dirty="0" err="1" smtClean="0"/>
+              <a:t>shinwook</a:t>
+            </a:r>
+            <a:r>
+              <a:rPr lang="en-US" altLang="ko-KR" sz="1500" dirty="0" smtClean="0"/>
+              <a:t>(</a:t>
+            </a:r>
+            <a:r>
+              <a:rPr lang="ko-KR" altLang="en-US" sz="1500" dirty="0" smtClean="0"/>
+              <a:t>내 작업환경</a:t>
+            </a:r>
+            <a:r>
+              <a:rPr lang="en-US" altLang="ko-KR" sz="1500" dirty="0" smtClean="0"/>
+              <a:t>)/</a:t>
+            </a:r>
+            <a:r>
+              <a:rPr lang="en-US" altLang="ko-KR" sz="1500" dirty="0" err="1" smtClean="0"/>
+              <a:t>wifiex</a:t>
+            </a:r>
+            <a:r>
+              <a:rPr lang="en-US" altLang="ko-KR" sz="1500" dirty="0" smtClean="0"/>
+              <a:t>(</a:t>
+            </a:r>
+            <a:r>
+              <a:rPr lang="ko-KR" altLang="en-US" sz="1500" dirty="0" err="1" smtClean="0"/>
+              <a:t>프로젝트명</a:t>
+            </a:r>
+            <a:r>
+              <a:rPr lang="en-US" altLang="ko-KR" sz="1500" dirty="0" smtClean="0"/>
+              <a:t>)/ firmware/0x40000.bin</a:t>
+            </a:r>
+            <a:r>
+              <a:rPr lang="en-US" altLang="ko-KR" sz="1500" dirty="0" smtClean="0"/>
+              <a:t>]</a:t>
+            </a:r>
+          </a:p>
+          <a:p>
+            <a:pPr>
+              <a:buNone/>
+            </a:pPr>
+            <a:r>
+              <a:rPr lang="en-US" altLang="ko-KR" sz="1500" dirty="0" smtClean="0"/>
+              <a:t># </a:t>
+            </a:r>
+            <a:r>
+              <a:rPr lang="ko-KR" altLang="en-US" sz="1500" dirty="0" smtClean="0"/>
+              <a:t>또는 </a:t>
+            </a:r>
+            <a:r>
+              <a:rPr lang="en-US" altLang="ko-KR" sz="1500" dirty="0" smtClean="0"/>
+              <a:t>“</a:t>
+            </a:r>
+            <a:r>
+              <a:rPr lang="en-US" altLang="ko-KR" sz="1500" dirty="0" err="1" smtClean="0"/>
+              <a:t>burnEsp</a:t>
+            </a:r>
+            <a:r>
+              <a:rPr lang="en-US" altLang="ko-KR" sz="1500" dirty="0" smtClean="0"/>
+              <a:t>” </a:t>
+            </a:r>
+            <a:r>
+              <a:rPr lang="ko-KR" altLang="en-US" sz="1500" dirty="0" smtClean="0"/>
+              <a:t>라는 이름의 파일을 만들고 그 안에 위의 명령어를 집어 넣은 뒤 </a:t>
+            </a:r>
+            <a:r>
+              <a:rPr lang="en-US" altLang="ko-KR" sz="1500" dirty="0" smtClean="0"/>
+              <a:t>[./</a:t>
+            </a:r>
+            <a:r>
+              <a:rPr lang="en-US" altLang="ko-KR" sz="1500" dirty="0" err="1" smtClean="0"/>
+              <a:t>burnEsp</a:t>
+            </a:r>
+            <a:r>
+              <a:rPr lang="en-US" altLang="ko-KR" sz="1500" dirty="0" smtClean="0"/>
+              <a:t>] </a:t>
+            </a:r>
+            <a:r>
+              <a:rPr lang="ko-KR" altLang="en-US" sz="1500" dirty="0" smtClean="0"/>
+              <a:t>명령어를 타이핑하면 </a:t>
+            </a:r>
+            <a:r>
+              <a:rPr lang="ko-KR" altLang="en-US" sz="1500" dirty="0" err="1" smtClean="0"/>
+              <a:t>펌웨어</a:t>
+            </a:r>
+            <a:r>
+              <a:rPr lang="ko-KR" altLang="en-US" sz="1500" dirty="0" smtClean="0"/>
+              <a:t> 업로드가 시작된다</a:t>
+            </a:r>
+            <a:r>
+              <a:rPr lang="en-US" altLang="ko-KR" sz="1500" dirty="0" smtClean="0"/>
+              <a:t>. </a:t>
+            </a:r>
+            <a:r>
+              <a:rPr lang="ko-KR" altLang="en-US" sz="1500" dirty="0" smtClean="0"/>
+              <a:t>이 방법을 권장한다</a:t>
+            </a:r>
+            <a:r>
+              <a:rPr lang="en-US" altLang="ko-KR" sz="1500" dirty="0" smtClean="0"/>
+              <a:t>. </a:t>
+            </a:r>
+            <a:r>
+              <a:rPr lang="ko-KR" altLang="en-US" sz="1500" dirty="0" smtClean="0"/>
+              <a:t>다음 </a:t>
+            </a:r>
+            <a:r>
+              <a:rPr lang="ko-KR" altLang="en-US" sz="1500" dirty="0" err="1" smtClean="0"/>
+              <a:t>프로젝트때</a:t>
+            </a:r>
+            <a:r>
+              <a:rPr lang="ko-KR" altLang="en-US" sz="1500" dirty="0" smtClean="0"/>
+              <a:t> 이 파일을 복사하고 위 명령어의 </a:t>
+            </a:r>
+            <a:r>
+              <a:rPr lang="en-US" altLang="ko-KR" sz="1500" dirty="0" smtClean="0"/>
+              <a:t>‘</a:t>
+            </a:r>
+            <a:r>
+              <a:rPr lang="ko-KR" altLang="en-US" sz="1500" dirty="0" err="1" smtClean="0"/>
+              <a:t>프로젝트명</a:t>
+            </a:r>
+            <a:r>
+              <a:rPr lang="en-US" altLang="ko-KR" sz="1500" dirty="0" smtClean="0"/>
+              <a:t>’ </a:t>
+            </a:r>
+            <a:r>
+              <a:rPr lang="ko-KR" altLang="en-US" sz="1500" dirty="0" smtClean="0"/>
+              <a:t>부분만 바꿔주면 된다</a:t>
+            </a:r>
+            <a:r>
+              <a:rPr lang="en-US" altLang="ko-KR" sz="1500" dirty="0" smtClean="0"/>
+              <a:t>. </a:t>
+            </a:r>
+            <a:r>
+              <a:rPr lang="ko-KR" altLang="en-US" sz="1500" dirty="0" smtClean="0"/>
+              <a:t>작업환경이 바뀌면 </a:t>
+            </a:r>
+            <a:r>
+              <a:rPr lang="en-US" altLang="ko-KR" sz="1500" dirty="0" smtClean="0"/>
+              <a:t>‘</a:t>
+            </a:r>
+            <a:r>
+              <a:rPr lang="ko-KR" altLang="en-US" sz="1500" dirty="0" smtClean="0"/>
+              <a:t>내 작업환경</a:t>
+            </a:r>
+            <a:r>
+              <a:rPr lang="en-US" altLang="ko-KR" sz="1500" dirty="0" smtClean="0"/>
+              <a:t>’ </a:t>
+            </a:r>
+            <a:r>
+              <a:rPr lang="ko-KR" altLang="en-US" sz="1500" dirty="0" smtClean="0"/>
+              <a:t>부분도 같이 바꿔 주어야 한다</a:t>
+            </a:r>
+            <a:r>
+              <a:rPr lang="en-US" altLang="ko-KR" sz="1500" dirty="0" smtClean="0"/>
+              <a:t>.</a:t>
+            </a:r>
+            <a:endParaRPr lang="ko-KR" altLang="en-US" sz="1500" dirty="0"/>
+          </a:p>
+        </p:txBody>
+      </p:sp>
+      <p:sp>
+        <p:nvSpPr>
+          <p:cNvPr id="5" name="슬라이드 번호 개체 틀 4"/>
           <p:cNvSpPr>
             <a:spLocks noGrp="1"/>
           </p:cNvSpPr>
@@ -3869,6 +4419,174 @@
               <a:rPr lang="ko-KR" altLang="en-US" smtClean="0"/>
               <a:pPr/>
               <a:t>11</a:t>
+            </a:fld>
+            <a:endParaRPr lang="ko-KR" altLang="en-US"/>
+          </a:p>
+        </p:txBody>
+      </p:sp>
+    </p:spTree>
+  </p:cSld>
+  <p:clrMapOvr>
+    <a:masterClrMapping/>
+  </p:clrMapOvr>
+  <p:timing>
+    <p:tnLst>
+      <p:par>
+        <p:cTn id="1" dur="indefinite" restart="never" nodeType="tmRoot"/>
+      </p:par>
+    </p:tnLst>
+  </p:timing>
+</p:sld>
+</file>
+
+<file path=ppt/slides/slide12.xml><?xml version="1.0" encoding="utf-8"?>
+<p:sld xmlns:a="http://schemas.openxmlformats.org/drawingml/2006/main" xmlns:r="http://schemas.openxmlformats.org/officeDocument/2006/relationships" xmlns:p="http://schemas.openxmlformats.org/presentationml/2006/main">
+  <p:cSld>
+    <p:spTree>
+      <p:nvGrpSpPr>
+        <p:cNvPr id="1" name=""/>
+        <p:cNvGrpSpPr/>
+        <p:nvPr/>
+      </p:nvGrpSpPr>
+      <p:grpSpPr>
+        <a:xfrm>
+          <a:off x="0" y="0"/>
+          <a:ext cx="0" cy="0"/>
+          <a:chOff x="0" y="0"/>
+          <a:chExt cx="0" cy="0"/>
+        </a:xfrm>
+      </p:grpSpPr>
+      <p:sp>
+        <p:nvSpPr>
+          <p:cNvPr id="5" name="제목 4"/>
+          <p:cNvSpPr>
+            <a:spLocks noGrp="1"/>
+          </p:cNvSpPr>
+          <p:nvPr>
+            <p:ph type="title"/>
+          </p:nvPr>
+        </p:nvSpPr>
+        <p:spPr/>
+        <p:txBody>
+          <a:bodyPr/>
+          <a:lstStyle/>
+          <a:p>
+            <a:r>
+              <a:rPr lang="en-US" altLang="ko-KR" dirty="0" smtClean="0"/>
+              <a:t>ESP8266</a:t>
+            </a:r>
+            <a:r>
+              <a:rPr lang="ko-KR" altLang="en-US" dirty="0" smtClean="0"/>
+              <a:t>에 업로드</a:t>
+            </a:r>
+            <a:endParaRPr lang="ko-KR" altLang="en-US" dirty="0"/>
+          </a:p>
+        </p:txBody>
+      </p:sp>
+      <p:sp>
+        <p:nvSpPr>
+          <p:cNvPr id="4" name="슬라이드 번호 개체 틀 3"/>
+          <p:cNvSpPr>
+            <a:spLocks noGrp="1"/>
+          </p:cNvSpPr>
+          <p:nvPr>
+            <p:ph type="sldNum" sz="quarter" idx="12"/>
+          </p:nvPr>
+        </p:nvSpPr>
+        <p:spPr/>
+        <p:txBody>
+          <a:bodyPr/>
+          <a:lstStyle/>
+          <a:p>
+            <a:fld id="{4BEDD84E-25D4-4983-8AA1-2863C96F08D9}" type="slidenum">
+              <a:rPr lang="ko-KR" altLang="en-US" smtClean="0"/>
+              <a:pPr/>
+              <a:t>12</a:t>
+            </a:fld>
+            <a:endParaRPr lang="ko-KR" altLang="en-US"/>
+          </a:p>
+        </p:txBody>
+      </p:sp>
+      <p:sp>
+        <p:nvSpPr>
+          <p:cNvPr id="6" name="내용 개체 틀 5"/>
+          <p:cNvSpPr>
+            <a:spLocks noGrp="1"/>
+          </p:cNvSpPr>
+          <p:nvPr>
+            <p:ph idx="1"/>
+          </p:nvPr>
+        </p:nvSpPr>
+        <p:spPr>
+          <a:xfrm>
+            <a:off x="467544" y="3140968"/>
+            <a:ext cx="8229600" cy="648072"/>
+          </a:xfrm>
+        </p:spPr>
+        <p:txBody>
+          <a:bodyPr/>
+          <a:lstStyle/>
+          <a:p>
+            <a:pPr algn="ctr"/>
+            <a:r>
+              <a:rPr lang="ko-KR" altLang="en-US" dirty="0" smtClean="0"/>
+              <a:t>업로드 과정 그림</a:t>
+            </a:r>
+            <a:endParaRPr lang="ko-KR" altLang="en-US" dirty="0"/>
+          </a:p>
+        </p:txBody>
+      </p:sp>
+    </p:spTree>
+  </p:cSld>
+  <p:clrMapOvr>
+    <a:masterClrMapping/>
+  </p:clrMapOvr>
+  <p:timing>
+    <p:tnLst>
+      <p:par>
+        <p:cTn id="1" dur="indefinite" restart="never" nodeType="tmRoot"/>
+      </p:par>
+    </p:tnLst>
+  </p:timing>
+</p:sld>
+</file>
+
+<file path=ppt/slides/slide13.xml><?xml version="1.0" encoding="utf-8"?>
+<p:sld xmlns:a="http://schemas.openxmlformats.org/drawingml/2006/main" xmlns:r="http://schemas.openxmlformats.org/officeDocument/2006/relationships" xmlns:p="http://schemas.openxmlformats.org/presentationml/2006/main">
+  <p:cSld>
+    <p:spTree>
+      <p:nvGrpSpPr>
+        <p:cNvPr id="1" name=""/>
+        <p:cNvGrpSpPr/>
+        <p:nvPr/>
+      </p:nvGrpSpPr>
+      <p:grpSpPr>
+        <a:xfrm>
+          <a:off x="0" y="0"/>
+          <a:ext cx="0" cy="0"/>
+          <a:chOff x="0" y="0"/>
+          <a:chExt cx="0" cy="0"/>
+        </a:xfrm>
+      </p:grpSpPr>
+      <p:sp>
+        <p:nvSpPr>
+          <p:cNvPr id="3" name="슬라이드 번호 개체 틀 2"/>
+          <p:cNvSpPr>
+            <a:spLocks noGrp="1"/>
+          </p:cNvSpPr>
+          <p:nvPr>
+            <p:ph type="sldNum" sz="quarter" idx="12"/>
+          </p:nvPr>
+        </p:nvSpPr>
+        <p:spPr/>
+        <p:txBody>
+          <a:bodyPr/>
+          <a:lstStyle/>
+          <a:p>
+            <a:fld id="{4BEDD84E-25D4-4983-8AA1-2863C96F08D9}" type="slidenum">
+              <a:rPr lang="ko-KR" altLang="en-US" smtClean="0"/>
+              <a:pPr/>
+              <a:t>13</a:t>
             </a:fld>
             <a:endParaRPr lang="ko-KR" altLang="en-US" dirty="0"/>
           </a:p>
@@ -3914,7 +4632,7 @@
         <p:spPr>
           <a:xfrm>
             <a:off x="683568" y="4077072"/>
-            <a:ext cx="7848872" cy="646331"/>
+            <a:ext cx="7848872" cy="1200329"/>
           </a:xfrm>
           <a:prstGeom prst="rect">
             <a:avLst/>
@@ -3987,7 +4705,36 @@
               <a:rPr lang="en-US" altLang="ko-KR" dirty="0" smtClean="0"/>
               <a:t>.</a:t>
             </a:r>
-            <a:endParaRPr lang="ko-KR" altLang="en-US" dirty="0"/>
+          </a:p>
+          <a:p>
+            <a:endParaRPr lang="en-US" altLang="ko-KR" dirty="0" smtClean="0"/>
+          </a:p>
+          <a:p>
+            <a:r>
+              <a:rPr lang="en-US" altLang="ko-KR" dirty="0" smtClean="0"/>
+              <a:t>#</a:t>
+            </a:r>
+            <a:r>
+              <a:rPr lang="ko-KR" altLang="en-US" dirty="0" smtClean="0"/>
+              <a:t> </a:t>
+            </a:r>
+            <a:r>
+              <a:rPr lang="ko-KR" altLang="en-US" dirty="0" smtClean="0"/>
+              <a:t>프로그래밍에 관한 자료도 위의 </a:t>
+            </a:r>
+            <a:r>
+              <a:rPr lang="en-US" altLang="ko-KR" dirty="0" err="1" smtClean="0"/>
+              <a:t>url</a:t>
+            </a:r>
+            <a:r>
+              <a:rPr lang="ko-KR" altLang="en-US" dirty="0" smtClean="0"/>
+              <a:t>을 통해 다운받을 수 있다</a:t>
+            </a:r>
+            <a:r>
+              <a:rPr lang="en-US" altLang="ko-KR" dirty="0" smtClean="0"/>
+              <a:t>.</a:t>
+            </a:r>
+            <a:endParaRPr lang="en-US" altLang="ko-KR" dirty="0" smtClean="0"/>
           </a:p>
         </p:txBody>
       </p:sp>
@@ -3996,6 +4743,13 @@
   <p:clrMapOvr>
     <a:masterClrMapping/>
   </p:clrMapOvr>
+  <p:timing>
+    <p:tnLst>
+      <p:par>
+        <p:cTn id="1" dur="indefinite" restart="never" nodeType="tmRoot"/>
+      </p:par>
+    </p:tnLst>
+  </p:timing>
 </p:sld>
 </file>
 
@@ -4064,40 +4818,22 @@
               <a:buAutoNum type="arabicPeriod"/>
             </a:pPr>
             <a:r>
-              <a:rPr lang="en-US" altLang="ko-KR" sz="1500" dirty="0" smtClean="0">
+              <a:rPr lang="en-US" altLang="ko-KR" sz="1500" dirty="0" err="1" smtClean="0"/>
+              <a:t>VirtualBox</a:t>
+            </a:r>
+            <a:r>
+              <a:rPr lang="ko-KR" altLang="en-US" sz="1500" dirty="0" smtClean="0"/>
+              <a:t>용 </a:t>
+            </a:r>
+            <a:r>
+              <a:rPr lang="ko-KR" altLang="en-US" sz="1500" dirty="0" smtClean="0">
                 <a:hlinkClick r:id="rId2"/>
               </a:rPr>
-              <a:t>https://</a:t>
-            </a:r>
-            <a:r>
-              <a:rPr lang="en-US" altLang="ko-KR" sz="1500" dirty="0" smtClean="0">
-                <a:hlinkClick r:id="rId2"/>
-              </a:rPr>
-              <a:t>drive.google.com/file/d/0BzEE0xWiSuFuWjA5Q3gyWWwxNk0/view</a:t>
-            </a:r>
-            <a:r>
-              <a:rPr lang="en-US" altLang="ko-KR" sz="1500" dirty="0" smtClean="0"/>
-              <a:t> </a:t>
+              <a:t>이미지 파일</a:t>
             </a:r>
             <a:r>
               <a:rPr lang="ko-KR" altLang="en-US" sz="1500" dirty="0" smtClean="0"/>
-              <a:t>에</a:t>
-            </a:r>
-            <a:r>
-              <a:rPr lang="ko-KR" altLang="en-US" sz="1500" dirty="0" smtClean="0"/>
-              <a:t>서</a:t>
-            </a:r>
-            <a:r>
-              <a:rPr lang="ko-KR" altLang="en-US" sz="1500" dirty="0" smtClean="0"/>
-              <a:t> </a:t>
-            </a:r>
-            <a:r>
-              <a:rPr lang="en-US" altLang="ko-KR" sz="1500" dirty="0" err="1" smtClean="0"/>
-              <a:t>VirtualBox</a:t>
-            </a:r>
-            <a:r>
-              <a:rPr lang="ko-KR" altLang="en-US" sz="1500" dirty="0" smtClean="0"/>
-              <a:t>용 이미지 파일을 다운받는다</a:t>
+              <a:t>을 다운받는다</a:t>
             </a:r>
             <a:r>
               <a:rPr lang="en-US" altLang="ko-KR" sz="1500" dirty="0" smtClean="0"/>
@@ -4109,12 +4845,22 @@
               <a:buAutoNum type="arabicPeriod"/>
             </a:pPr>
             <a:r>
-              <a:rPr lang="en-US" altLang="ko-KR" sz="1500" dirty="0" err="1" smtClean="0"/>
-              <a:t>VirtualBox</a:t>
+              <a:rPr lang="ko-KR" altLang="en-US" sz="1500" dirty="0" err="1" smtClean="0"/>
+              <a:t>버추얼</a:t>
             </a:r>
             <a:r>
               <a:rPr lang="ko-KR" altLang="en-US" sz="1500" dirty="0" smtClean="0"/>
-              <a:t>에 다운받은 이미지 파일을 추가하고 실행시킨다</a:t>
+              <a:t> 박스 </a:t>
+            </a:r>
+            <a:r>
+              <a:rPr lang="ko-KR" altLang="en-US" sz="1500" dirty="0" smtClean="0">
+                <a:hlinkClick r:id="rId3"/>
+              </a:rPr>
+              <a:t>확장 패키지</a:t>
+            </a:r>
+            <a:r>
+              <a:rPr lang="ko-KR" altLang="en-US" sz="1500" dirty="0" smtClean="0"/>
+              <a:t>를 다운받고 실행하여 설치한다</a:t>
             </a:r>
             <a:r>
               <a:rPr lang="en-US" altLang="ko-KR" sz="1500" dirty="0" smtClean="0"/>
@@ -4126,48 +4872,12 @@
               <a:buAutoNum type="arabicPeriod"/>
             </a:pPr>
             <a:r>
+              <a:rPr lang="en-US" altLang="ko-KR" sz="1500" dirty="0" err="1" smtClean="0"/>
+              <a:t>VirtualBox</a:t>
+            </a:r>
+            <a:r>
               <a:rPr lang="ko-KR" altLang="en-US" sz="1500" dirty="0" smtClean="0"/>
-              <a:t>터미널</a:t>
-            </a:r>
-            <a:r>
-              <a:rPr lang="en-US" altLang="ko-KR" sz="1500" dirty="0" smtClean="0"/>
-              <a:t>(</a:t>
-            </a:r>
-            <a:r>
-              <a:rPr lang="en-US" altLang="ko-KR" sz="1500" dirty="0" err="1" smtClean="0"/>
-              <a:t>ExTerminal</a:t>
-            </a:r>
-            <a:r>
-              <a:rPr lang="en-US" altLang="ko-KR" sz="1500" dirty="0" smtClean="0"/>
-              <a:t>)</a:t>
-            </a:r>
-            <a:r>
-              <a:rPr lang="ko-KR" altLang="en-US" sz="1500" dirty="0" smtClean="0"/>
-              <a:t>을 실행시켜서 </a:t>
-            </a:r>
-            <a:r>
-              <a:rPr lang="en-US" altLang="ko-KR" sz="1500" dirty="0" smtClean="0"/>
-              <a:t>‘/opt/</a:t>
-            </a:r>
-            <a:r>
-              <a:rPr lang="en-US" altLang="ko-KR" sz="1500" dirty="0" err="1" smtClean="0"/>
-              <a:t>Espressif</a:t>
-            </a:r>
-            <a:r>
-              <a:rPr lang="en-US" altLang="ko-KR" sz="1500" dirty="0" smtClean="0"/>
-              <a:t>/ESP8266_SDK‘</a:t>
-            </a:r>
-            <a:r>
-              <a:rPr lang="ko-KR" altLang="en-US" sz="1500" dirty="0" smtClean="0"/>
-              <a:t> </a:t>
-            </a:r>
-            <a:r>
-              <a:rPr lang="ko-KR" altLang="en-US" sz="1500" dirty="0" err="1" smtClean="0"/>
-              <a:t>로</a:t>
-            </a:r>
-            <a:r>
-              <a:rPr lang="ko-KR" altLang="en-US" sz="1500" dirty="0" smtClean="0"/>
-              <a:t> 이동한다</a:t>
+              <a:t>에 다운받은 이미지 파일을 추가하고 실행시킨다</a:t>
             </a:r>
             <a:r>
               <a:rPr lang="en-US" altLang="ko-KR" sz="1500" dirty="0" smtClean="0"/>
@@ -4180,43 +4890,51 @@
             </a:pPr>
             <a:r>
               <a:rPr lang="ko-KR" altLang="en-US" sz="1500" dirty="0" smtClean="0"/>
-              <a:t>자신이 사용할 </a:t>
+              <a:t>터미널</a:t>
+            </a:r>
+            <a:r>
+              <a:rPr lang="en-US" altLang="ko-KR" sz="1500" dirty="0" smtClean="0"/>
+              <a:t>(</a:t>
+            </a:r>
+            <a:r>
+              <a:rPr lang="en-US" altLang="ko-KR" sz="1500" dirty="0" err="1" smtClean="0"/>
+              <a:t>ExTerminal</a:t>
+            </a:r>
+            <a:r>
+              <a:rPr lang="en-US" altLang="ko-KR" sz="1500" dirty="0" smtClean="0"/>
+              <a:t>)</a:t>
+            </a:r>
+            <a:r>
+              <a:rPr lang="ko-KR" altLang="en-US" sz="1500" dirty="0" smtClean="0"/>
+              <a:t>을 실행시켜서 </a:t>
+            </a:r>
+            <a:r>
+              <a:rPr lang="en-US" altLang="ko-KR" sz="1500" dirty="0" smtClean="0"/>
+              <a:t>‘/opt/</a:t>
+            </a:r>
+            <a:r>
+              <a:rPr lang="en-US" altLang="ko-KR" sz="1500" dirty="0" err="1" smtClean="0"/>
+              <a:t>Espressif</a:t>
+            </a:r>
+            <a:r>
+              <a:rPr lang="en-US" altLang="ko-KR" sz="1500" dirty="0" smtClean="0"/>
+              <a:t>/ESP8266_SDK‘</a:t>
+            </a:r>
+            <a:r>
+              <a:rPr lang="ko-KR" altLang="en-US" sz="1500" dirty="0" smtClean="0"/>
+              <a:t> </a:t>
             </a:r>
             <a:r>
               <a:rPr lang="ko-KR" altLang="en-US" sz="1500" dirty="0" err="1" smtClean="0"/>
-              <a:t>디렉토리를</a:t>
+              <a:t>로</a:t>
             </a:r>
             <a:r>
               <a:rPr lang="ko-KR" altLang="en-US" sz="1500" dirty="0" smtClean="0"/>
-              <a:t> 만든다</a:t>
-            </a:r>
-            <a:r>
-              <a:rPr lang="en-US" altLang="ko-KR" sz="1500" dirty="0" smtClean="0"/>
-              <a:t>.(</a:t>
-            </a:r>
-            <a:r>
-              <a:rPr lang="ko-KR" altLang="en-US" sz="1500" dirty="0" smtClean="0"/>
-              <a:t>여기서는 </a:t>
-            </a:r>
-            <a:r>
-              <a:rPr lang="en-US" altLang="ko-KR" sz="1500" dirty="0" smtClean="0"/>
-              <a:t>‘</a:t>
-            </a:r>
-            <a:r>
-              <a:rPr lang="en-US" altLang="ko-KR" sz="1500" dirty="0" err="1" smtClean="0"/>
-              <a:t>shinwook</a:t>
-            </a:r>
-            <a:r>
-              <a:rPr lang="en-US" altLang="ko-KR" sz="1500" dirty="0" smtClean="0"/>
-              <a:t>’ </a:t>
-            </a:r>
-            <a:r>
-              <a:rPr lang="ko-KR" altLang="en-US" sz="1500" dirty="0" smtClean="0"/>
-              <a:t>이름으로 만든다</a:t>
-            </a:r>
-            <a:r>
-              <a:rPr lang="en-US" altLang="ko-KR" sz="1500" dirty="0" smtClean="0"/>
-              <a:t>.)</a:t>
+              <a:t> 이동한다</a:t>
+            </a:r>
+            <a:r>
+              <a:rPr lang="en-US" altLang="ko-KR" sz="1500" dirty="0" smtClean="0"/>
+              <a:t>.</a:t>
             </a:r>
           </a:p>
           <a:p>
@@ -4224,20 +4942,65 @@
               <a:buAutoNum type="arabicPeriod"/>
             </a:pPr>
             <a:r>
+              <a:rPr lang="ko-KR" altLang="en-US" sz="1500" dirty="0" smtClean="0"/>
+              <a:t>자신이 사용할 </a:t>
+            </a:r>
+            <a:r>
+              <a:rPr lang="ko-KR" altLang="en-US" sz="1500" dirty="0" err="1" smtClean="0"/>
+              <a:t>디렉토리를</a:t>
+            </a:r>
+            <a:r>
+              <a:rPr lang="ko-KR" altLang="en-US" sz="1500" dirty="0" smtClean="0"/>
+              <a:t> 만든다</a:t>
+            </a:r>
+            <a:r>
+              <a:rPr lang="en-US" altLang="ko-KR" sz="1500" dirty="0" smtClean="0"/>
+              <a:t>.(</a:t>
+            </a:r>
+            <a:r>
+              <a:rPr lang="ko-KR" altLang="en-US" sz="1500" dirty="0" smtClean="0"/>
+              <a:t>여기서는 </a:t>
+            </a:r>
+            <a:r>
+              <a:rPr lang="en-US" altLang="ko-KR" sz="1500" dirty="0" smtClean="0"/>
+              <a:t>‘</a:t>
+            </a:r>
+            <a:r>
+              <a:rPr lang="en-US" altLang="ko-KR" sz="1500" dirty="0" err="1" smtClean="0"/>
+              <a:t>shinwook</a:t>
+            </a:r>
+            <a:r>
+              <a:rPr lang="en-US" altLang="ko-KR" sz="1500" dirty="0" smtClean="0"/>
+              <a:t>’ </a:t>
+            </a:r>
+            <a:r>
+              <a:rPr lang="ko-KR" altLang="en-US" sz="1500" dirty="0" smtClean="0"/>
+              <a:t>이름으로 만든다</a:t>
+            </a:r>
+            <a:r>
+              <a:rPr lang="en-US" altLang="ko-KR" sz="1500" dirty="0" smtClean="0"/>
+              <a:t>.)</a:t>
+            </a:r>
+          </a:p>
+          <a:p>
+            <a:pPr>
+              <a:buAutoNum type="arabicPeriod"/>
+            </a:pPr>
+            <a:r>
               <a:rPr lang="en-US" altLang="ko-KR" sz="1500" dirty="0" smtClean="0">
-                <a:hlinkClick r:id="rId3"/>
+                <a:hlinkClick r:id="rId4"/>
               </a:rPr>
               <a:t>https</a:t>
             </a:r>
             <a:r>
               <a:rPr lang="en-US" altLang="ko-KR" sz="1500" dirty="0" smtClean="0">
-                <a:hlinkClick r:id="rId3"/>
+                <a:hlinkClick r:id="rId4"/>
               </a:rPr>
               <a:t>://</a:t>
             </a:r>
             <a:r>
               <a:rPr lang="en-US" altLang="ko-KR" sz="1500" dirty="0" smtClean="0">
-                <a:hlinkClick r:id="rId3"/>
+                <a:hlinkClick r:id="rId4"/>
               </a:rPr>
               <a:t>github.com/SleeperKKY/ESP8266</a:t>
             </a:r>
@@ -4301,18 +5064,6 @@
               <a:rPr lang="en-US" altLang="ko-KR" sz="1500" dirty="0" smtClean="0"/>
               <a:t>.</a:t>
             </a:r>
-            <a:endParaRPr lang="en-US" altLang="ko-KR" sz="1500" dirty="0" smtClean="0"/>
-          </a:p>
-          <a:p>
-            <a:pPr>
-              <a:buNone/>
-            </a:pPr>
-            <a:endParaRPr lang="en-US" altLang="ko-KR" sz="1500" dirty="0" smtClean="0"/>
-          </a:p>
-          <a:p>
-            <a:pPr>
-              <a:buNone/>
-            </a:pPr>
             <a:endParaRPr lang="en-US" altLang="ko-KR" sz="1500" dirty="0" smtClean="0"/>
           </a:p>
           <a:p>
@@ -4483,6 +5234,13 @@
   <p:clrMapOvr>
     <a:masterClrMapping/>
   </p:clrMapOvr>
+  <p:timing>
+    <p:tnLst>
+      <p:par>
+        <p:cTn id="1" dur="indefinite" restart="never" nodeType="tmRoot"/>
+      </p:par>
+    </p:tnLst>
+  </p:timing>
 </p:sld>
 </file>
 
@@ -4554,32 +5312,6 @@
           </a:p>
         </p:txBody>
       </p:sp>
-      <p:pic>
-        <p:nvPicPr>
-          <p:cNvPr id="1026" name="Picture 2" descr="H:\ESP8266Wifi ModuleSDK\doc\ppt이미지\ESP8266 코딩 환경 만들기\버추얼 박스 이미지 추가.jpg"/>
-          <p:cNvPicPr>
-            <a:picLocks noChangeAspect="1" noChangeArrowheads="1"/>
-          </p:cNvPicPr>
-          <p:nvPr/>
-        </p:nvPicPr>
-        <p:blipFill>
-          <a:blip r:embed="rId2" cstate="print"/>
-          <a:srcRect/>
-          <a:stretch>
-            <a:fillRect/>
-          </a:stretch>
-        </p:blipFill>
-        <p:spPr bwMode="auto">
-          <a:xfrm>
-            <a:off x="1331640" y="1052736"/>
-            <a:ext cx="6547445" cy="4600218"/>
-          </a:xfrm>
-          <a:prstGeom prst="rect">
-            <a:avLst/>
-          </a:prstGeom>
-          <a:noFill/>
-        </p:spPr>
-      </p:pic>
       <p:sp>
         <p:nvSpPr>
           <p:cNvPr id="10" name="제목 1"/>
@@ -4669,11 +5401,70 @@
           </a:p>
         </p:txBody>
       </p:sp>
+      <p:pic>
+        <p:nvPicPr>
+          <p:cNvPr id="1027" name="Picture 3" descr="H:\ESP8266Wifi ModuleSDK\doc\ppt이미지\ESP8266 코딩 환경 만들기\버추얼 머신에 이미지 추가.jpg"/>
+          <p:cNvPicPr>
+            <a:picLocks noChangeAspect="1" noChangeArrowheads="1"/>
+          </p:cNvPicPr>
+          <p:nvPr/>
+        </p:nvPicPr>
+        <p:blipFill>
+          <a:blip r:embed="rId2" cstate="print"/>
+          <a:srcRect/>
+          <a:stretch>
+            <a:fillRect/>
+          </a:stretch>
+        </p:blipFill>
+        <p:spPr bwMode="auto">
+          <a:xfrm>
+            <a:off x="2339752" y="2060848"/>
+            <a:ext cx="4752528" cy="3339114"/>
+          </a:xfrm>
+          <a:prstGeom prst="rect">
+            <a:avLst/>
+          </a:prstGeom>
+          <a:noFill/>
+        </p:spPr>
+      </p:pic>
+      <p:pic>
+        <p:nvPicPr>
+          <p:cNvPr id="1028" name="Picture 4" descr="H:\ESP8266Wifi ModuleSDK\doc\ppt이미지\ESP8266 코딩 환경 만들기\ESP8266 버추얼 머신 이미지 파일.jpg"/>
+          <p:cNvPicPr>
+            <a:picLocks noChangeAspect="1" noChangeArrowheads="1"/>
+          </p:cNvPicPr>
+          <p:nvPr/>
+        </p:nvPicPr>
+        <p:blipFill>
+          <a:blip r:embed="rId3" cstate="print"/>
+          <a:srcRect/>
+          <a:stretch>
+            <a:fillRect/>
+          </a:stretch>
+        </p:blipFill>
+        <p:spPr bwMode="auto">
+          <a:xfrm>
+            <a:off x="1475656" y="1340768"/>
+            <a:ext cx="6503223" cy="360040"/>
+          </a:xfrm>
+          <a:prstGeom prst="rect">
+            <a:avLst/>
+          </a:prstGeom>
+          <a:noFill/>
+        </p:spPr>
+      </p:pic>
     </p:spTree>
   </p:cSld>
   <p:clrMapOvr>
     <a:masterClrMapping/>
   </p:clrMapOvr>
+  <p:timing>
+    <p:tnLst>
+      <p:par>
+        <p:cTn id="1" dur="indefinite" restart="never" nodeType="tmRoot"/>
+      </p:par>
+    </p:tnLst>
+  </p:timing>
 </p:sld>
 </file>
 
@@ -4696,34 +5487,7 @@
       </p:grpSpPr>
       <p:sp>
         <p:nvSpPr>
-          <p:cNvPr id="6" name="제목 1"/>
-          <p:cNvSpPr>
-            <a:spLocks noGrp="1"/>
-          </p:cNvSpPr>
-          <p:nvPr>
-            <p:ph type="title"/>
-          </p:nvPr>
-        </p:nvSpPr>
-        <p:spPr/>
-        <p:txBody>
-          <a:bodyPr/>
-          <a:lstStyle/>
-          <a:p>
-            <a:r>
-              <a:rPr lang="en-US" altLang="ko-KR" dirty="0" smtClean="0"/>
-              <a:t>ESP8266 </a:t>
-            </a:r>
-            <a:r>
-              <a:rPr lang="ko-KR" altLang="en-US" dirty="0" smtClean="0"/>
-              <a:t>코딩 환경 만들기</a:t>
-            </a:r>
-            <a:endParaRPr lang="ko-KR" altLang="en-US" dirty="0"/>
-          </a:p>
-        </p:txBody>
-      </p:sp>
-      <p:sp>
-        <p:nvSpPr>
-          <p:cNvPr id="5" name="슬라이드 번호 개체 틀 4"/>
+          <p:cNvPr id="3" name="슬라이드 번호 개체 틀 2"/>
           <p:cNvSpPr>
             <a:spLocks noGrp="1"/>
           </p:cNvSpPr>
@@ -4741,13 +5505,45 @@
               <a:pPr/>
               <a:t>4</a:t>
             </a:fld>
-            <a:endParaRPr lang="ko-KR" altLang="en-US"/>
+            <a:endParaRPr lang="ko-KR" altLang="en-US" dirty="0"/>
+          </a:p>
+        </p:txBody>
+      </p:sp>
+      <p:sp>
+        <p:nvSpPr>
+          <p:cNvPr id="5" name="제목 1"/>
+          <p:cNvSpPr>
+            <a:spLocks noGrp="1"/>
+          </p:cNvSpPr>
+          <p:nvPr>
+            <p:ph type="title"/>
+          </p:nvPr>
+        </p:nvSpPr>
+        <p:spPr>
+          <a:xfrm>
+            <a:off x="4788024" y="260648"/>
+            <a:ext cx="3898776" cy="490066"/>
+          </a:xfrm>
+        </p:spPr>
+        <p:txBody>
+          <a:bodyPr/>
+          <a:lstStyle/>
+          <a:p>
+            <a:r>
+              <a:rPr lang="en-US" altLang="ko-KR" dirty="0" smtClean="0"/>
+              <a:t>ESP8266 </a:t>
+            </a:r>
+            <a:r>
+              <a:rPr lang="ko-KR" altLang="en-US" dirty="0" smtClean="0"/>
+              <a:t>코딩 환경 만들기</a:t>
+            </a:r>
+            <a:endParaRPr lang="ko-KR" altLang="en-US" dirty="0"/>
           </a:p>
         </p:txBody>
       </p:sp>
       <p:pic>
         <p:nvPicPr>
-          <p:cNvPr id="2050" name="Picture 2" descr="H:\ESP8266Wifi ModuleSDK\doc\ppt이미지\ESP8266 코딩 환경 만들기\공유폴더 'Share' 제거.jpg"/>
+          <p:cNvPr id="6146" name="Picture 2" descr="H:\ESP8266Wifi ModuleSDK\doc\ppt이미지\ESP8266 코딩 환경 만들기\버추얼 머신 extension pack 설치2.jpg"/>
           <p:cNvPicPr>
             <a:picLocks noChangeAspect="1" noChangeArrowheads="1"/>
           </p:cNvPicPr>
@@ -4762,8 +5558,8 @@
         </p:blipFill>
         <p:spPr bwMode="auto">
           <a:xfrm>
-            <a:off x="1514474" y="1466850"/>
-            <a:ext cx="6535931" cy="4194398"/>
+            <a:off x="2195736" y="1772816"/>
+            <a:ext cx="5040560" cy="3541484"/>
           </a:xfrm>
           <a:prstGeom prst="rect">
             <a:avLst/>
@@ -4771,9 +5567,35 @@
           <a:noFill/>
         </p:spPr>
       </p:pic>
-      <p:sp>
-        <p:nvSpPr>
-          <p:cNvPr id="7" name="제목 1"/>
+      <p:pic>
+        <p:nvPicPr>
+          <p:cNvPr id="6147" name="Picture 3" descr="H:\ESP8266Wifi ModuleSDK\doc\ppt이미지\ESP8266 코딩 환경 만들기\버추얼 머신 extension pack 설치.jpg"/>
+          <p:cNvPicPr>
+            <a:picLocks noChangeAspect="1" noChangeArrowheads="1"/>
+          </p:cNvPicPr>
+          <p:nvPr/>
+        </p:nvPicPr>
+        <p:blipFill>
+          <a:blip r:embed="rId3" cstate="print"/>
+          <a:srcRect/>
+          <a:stretch>
+            <a:fillRect/>
+          </a:stretch>
+        </p:blipFill>
+        <p:spPr bwMode="auto">
+          <a:xfrm>
+            <a:off x="1763688" y="1196752"/>
+            <a:ext cx="6257925" cy="257175"/>
+          </a:xfrm>
+          <a:prstGeom prst="rect">
+            <a:avLst/>
+          </a:prstGeom>
+          <a:noFill/>
+        </p:spPr>
+      </p:pic>
+      <p:sp>
+        <p:nvSpPr>
+          <p:cNvPr id="8" name="제목 1"/>
           <p:cNvSpPr txBox="1">
             <a:spLocks/>
           </p:cNvSpPr>
@@ -4781,8 +5603,8 @@
         </p:nvSpPr>
         <p:spPr>
           <a:xfrm>
-            <a:off x="2771800" y="5805264"/>
-            <a:ext cx="3898776" cy="490066"/>
+            <a:off x="2771800" y="5589240"/>
+            <a:ext cx="3960440" cy="504056"/>
           </a:xfrm>
           <a:prstGeom prst="rect">
             <a:avLst/>
@@ -4790,7 +5612,7 @@
         </p:spPr>
         <p:txBody>
           <a:bodyPr vert="horz" lIns="91440" tIns="45720" rIns="91440" bIns="45720" rtlCol="0" anchor="ctr">
-            <a:normAutofit/>
+            <a:normAutofit fontScale="92500"/>
           </a:bodyPr>
           <a:lstStyle/>
           <a:p>
@@ -4833,7 +5655,15 @@
                 <a:ea typeface="+mj-ea"/>
                 <a:cs typeface="+mj-cs"/>
               </a:rPr>
-              <a:t> Share </a:t>
+              <a:t> </a:t>
+            </a:r>
+            <a:r>
+              <a:rPr lang="ko-KR" altLang="en-US" dirty="0" err="1" smtClean="0">
+                <a:latin typeface="+mj-lt"/>
+                <a:ea typeface="+mj-ea"/>
+                <a:cs typeface="+mj-cs"/>
+              </a:rPr>
+              <a:t>버추얼</a:t>
             </a:r>
             <a:r>
               <a:rPr lang="ko-KR" altLang="en-US" dirty="0" smtClean="0">
@@ -4841,7 +5671,7 @@
                 <a:ea typeface="+mj-ea"/>
                 <a:cs typeface="+mj-cs"/>
               </a:rPr>
-              <a:t>폴더 제거</a:t>
+              <a:t> 박스 확장 패키지 설치</a:t>
             </a:r>
             <a:endParaRPr kumimoji="0" lang="ko-KR" altLang="en-US" b="0" i="0" u="none" strike="noStrike" kern="1200" cap="none" spc="0" normalizeH="0" baseline="0" noProof="0" dirty="0">
               <a:ln>
@@ -4931,6 +5761,291 @@
               <a:rPr lang="ko-KR" altLang="en-US" smtClean="0"/>
               <a:pPr/>
               <a:t>5</a:t>
+            </a:fld>
+            <a:endParaRPr lang="ko-KR" altLang="en-US"/>
+          </a:p>
+        </p:txBody>
+      </p:sp>
+      <p:sp>
+        <p:nvSpPr>
+          <p:cNvPr id="7" name="제목 1"/>
+          <p:cNvSpPr txBox="1">
+            <a:spLocks/>
+          </p:cNvSpPr>
+          <p:nvPr/>
+        </p:nvSpPr>
+        <p:spPr>
+          <a:xfrm>
+            <a:off x="2771800" y="5805264"/>
+            <a:ext cx="3898776" cy="490066"/>
+          </a:xfrm>
+          <a:prstGeom prst="rect">
+            <a:avLst/>
+          </a:prstGeom>
+        </p:spPr>
+        <p:txBody>
+          <a:bodyPr vert="horz" lIns="91440" tIns="45720" rIns="91440" bIns="45720" rtlCol="0" anchor="ctr">
+            <a:normAutofit/>
+          </a:bodyPr>
+          <a:lstStyle/>
+          <a:p>
+            <a:pPr marL="0" marR="0" lvl="0" indent="0" algn="ctr" defTabSz="914400" rtl="0" eaLnBrk="1" fontAlgn="auto" latinLnBrk="1" hangingPunct="1">
+              <a:lnSpc>
+                <a:spcPct val="100000"/>
+              </a:lnSpc>
+              <a:spcBef>
+                <a:spcPct val="0"/>
+              </a:spcBef>
+              <a:spcAft>
+                <a:spcPts val="0"/>
+              </a:spcAft>
+              <a:buClrTx/>
+              <a:buSzTx/>
+              <a:buFontTx/>
+              <a:buNone/>
+              <a:tabLst/>
+              <a:defRPr/>
+            </a:pPr>
+            <a:r>
+              <a:rPr lang="ko-KR" altLang="en-US" dirty="0" smtClean="0">
+                <a:latin typeface="+mj-lt"/>
+                <a:ea typeface="+mj-ea"/>
+                <a:cs typeface="+mj-cs"/>
+              </a:rPr>
+              <a:t>그림 </a:t>
+            </a:r>
+            <a:r>
+              <a:rPr lang="en-US" altLang="ko-KR" dirty="0" smtClean="0">
+                <a:latin typeface="+mj-lt"/>
+                <a:ea typeface="+mj-ea"/>
+                <a:cs typeface="+mj-cs"/>
+              </a:rPr>
+              <a:t>2</a:t>
+            </a:r>
+            <a:r>
+              <a:rPr lang="en-US" altLang="ko-KR" dirty="0" smtClean="0">
+                <a:latin typeface="+mj-lt"/>
+                <a:ea typeface="+mj-ea"/>
+                <a:cs typeface="+mj-cs"/>
+              </a:rPr>
+              <a:t> Share </a:t>
+            </a:r>
+            <a:r>
+              <a:rPr lang="ko-KR" altLang="en-US" dirty="0" smtClean="0">
+                <a:latin typeface="+mj-lt"/>
+                <a:ea typeface="+mj-ea"/>
+                <a:cs typeface="+mj-cs"/>
+              </a:rPr>
+              <a:t>폴더 제거</a:t>
+            </a:r>
+            <a:endParaRPr kumimoji="0" lang="ko-KR" altLang="en-US" b="0" i="0" u="none" strike="noStrike" kern="1200" cap="none" spc="0" normalizeH="0" baseline="0" noProof="0" dirty="0">
+              <a:ln>
+                <a:noFill/>
+              </a:ln>
+              <a:solidFill>
+                <a:schemeClr val="tx1"/>
+              </a:solidFill>
+              <a:effectLst/>
+              <a:uLnTx/>
+              <a:uFillTx/>
+              <a:latin typeface="+mj-lt"/>
+              <a:ea typeface="+mj-ea"/>
+              <a:cs typeface="+mj-cs"/>
+            </a:endParaRPr>
+          </a:p>
+        </p:txBody>
+      </p:sp>
+      <p:sp>
+        <p:nvSpPr>
+          <p:cNvPr id="10" name="TextBox 9"/>
+          <p:cNvSpPr txBox="1"/>
+          <p:nvPr/>
+        </p:nvSpPr>
+        <p:spPr>
+          <a:xfrm>
+            <a:off x="827584" y="915978"/>
+            <a:ext cx="7632848" cy="784830"/>
+          </a:xfrm>
+          <a:prstGeom prst="rect">
+            <a:avLst/>
+          </a:prstGeom>
+          <a:noFill/>
+        </p:spPr>
+        <p:txBody>
+          <a:bodyPr wrap="square" rtlCol="0">
+            <a:spAutoFit/>
+          </a:bodyPr>
+          <a:lstStyle/>
+          <a:p>
+            <a:pPr marL="342900" indent="-342900">
+              <a:buAutoNum type="arabicPeriod"/>
+            </a:pPr>
+            <a:r>
+              <a:rPr lang="ko-KR" altLang="en-US" sz="1500" dirty="0" smtClean="0"/>
+              <a:t>이미지에 오른쪽 마우스를 클릭한 뒤 </a:t>
+            </a:r>
+            <a:r>
+              <a:rPr lang="en-US" altLang="ko-KR" sz="1500" dirty="0" smtClean="0"/>
+              <a:t>[</a:t>
+            </a:r>
+            <a:r>
+              <a:rPr lang="ko-KR" altLang="en-US" sz="1500" dirty="0" smtClean="0"/>
+              <a:t>설정</a:t>
+            </a:r>
+            <a:r>
+              <a:rPr lang="en-US" altLang="ko-KR" sz="1500" dirty="0" smtClean="0"/>
+              <a:t>]</a:t>
+            </a:r>
+            <a:r>
+              <a:rPr lang="ko-KR" altLang="en-US" sz="1500" dirty="0" smtClean="0"/>
+              <a:t>을 클릭한다</a:t>
+            </a:r>
+            <a:r>
+              <a:rPr lang="en-US" altLang="ko-KR" sz="1500" dirty="0" smtClean="0"/>
+              <a:t>.</a:t>
+            </a:r>
+            <a:endParaRPr lang="en-US" altLang="ko-KR" sz="1500" dirty="0" smtClean="0"/>
+          </a:p>
+          <a:p>
+            <a:pPr marL="342900" indent="-342900">
+              <a:buAutoNum type="arabicPeriod"/>
+            </a:pPr>
+            <a:r>
+              <a:rPr lang="en-US" altLang="ko-KR" sz="1500" dirty="0" smtClean="0"/>
+              <a:t>[</a:t>
+            </a:r>
+            <a:r>
+              <a:rPr lang="ko-KR" altLang="en-US" sz="1500" dirty="0" smtClean="0"/>
+              <a:t>그림</a:t>
+            </a:r>
+            <a:r>
+              <a:rPr lang="en-US" altLang="ko-KR" sz="1500" dirty="0" smtClean="0"/>
+              <a:t>2]</a:t>
+            </a:r>
+            <a:r>
+              <a:rPr lang="ko-KR" altLang="en-US" sz="1500" dirty="0" smtClean="0"/>
+              <a:t>와 같이 공유폴더를 눌러서 </a:t>
+            </a:r>
+            <a:r>
+              <a:rPr lang="en-US" altLang="ko-KR" sz="1500" dirty="0" smtClean="0"/>
+              <a:t>Share</a:t>
+            </a:r>
+            <a:r>
+              <a:rPr lang="ko-KR" altLang="en-US" sz="1500" dirty="0" smtClean="0"/>
+              <a:t>폴더를 클릭한 뒤 우측에 있는 지우기 아이콘을 클릭하여 폴더를 삭제한다</a:t>
+            </a:r>
+            <a:r>
+              <a:rPr lang="en-US" altLang="ko-KR" sz="1500" dirty="0" smtClean="0"/>
+              <a:t>.</a:t>
+            </a:r>
+            <a:endParaRPr lang="en-US" altLang="ko-KR" sz="1500" dirty="0" smtClean="0"/>
+          </a:p>
+        </p:txBody>
+      </p:sp>
+      <p:pic>
+        <p:nvPicPr>
+          <p:cNvPr id="2052" name="Picture 4" descr="H:\ESP8266Wifi ModuleSDK\doc\ppt이미지\ESP8266 코딩 환경 만들기\공유폴더 'Share' 제거.jpg"/>
+          <p:cNvPicPr>
+            <a:picLocks noChangeAspect="1" noChangeArrowheads="1"/>
+          </p:cNvPicPr>
+          <p:nvPr/>
+        </p:nvPicPr>
+        <p:blipFill>
+          <a:blip r:embed="rId2" cstate="print"/>
+          <a:srcRect/>
+          <a:stretch>
+            <a:fillRect/>
+          </a:stretch>
+        </p:blipFill>
+        <p:spPr bwMode="auto">
+          <a:xfrm>
+            <a:off x="1907704" y="2010816"/>
+            <a:ext cx="5400600" cy="3794448"/>
+          </a:xfrm>
+          <a:prstGeom prst="rect">
+            <a:avLst/>
+          </a:prstGeom>
+          <a:noFill/>
+        </p:spPr>
+      </p:pic>
+    </p:spTree>
+  </p:cSld>
+  <p:clrMapOvr>
+    <a:masterClrMapping/>
+  </p:clrMapOvr>
+  <p:timing>
+    <p:tnLst>
+      <p:par>
+        <p:cTn id="1" dur="indefinite" restart="never" nodeType="tmRoot"/>
+      </p:par>
+    </p:tnLst>
+  </p:timing>
+</p:sld>
+</file>
+
+<file path=ppt/slides/slide6.xml><?xml version="1.0" encoding="utf-8"?>
+<p:sld xmlns:a="http://schemas.openxmlformats.org/drawingml/2006/main" xmlns:r="http://schemas.openxmlformats.org/officeDocument/2006/relationships" xmlns:p="http://schemas.openxmlformats.org/presentationml/2006/main">
+  <p:cSld>
+    <p:spTree>
+      <p:nvGrpSpPr>
+        <p:cNvPr id="1" name=""/>
+        <p:cNvGrpSpPr/>
+        <p:nvPr/>
+      </p:nvGrpSpPr>
+      <p:grpSpPr>
+        <a:xfrm>
+          <a:off x="0" y="0"/>
+          <a:ext cx="0" cy="0"/>
+          <a:chOff x="0" y="0"/>
+          <a:chExt cx="0" cy="0"/>
+        </a:xfrm>
+      </p:grpSpPr>
+      <p:sp>
+        <p:nvSpPr>
+          <p:cNvPr id="6" name="제목 1"/>
+          <p:cNvSpPr>
+            <a:spLocks noGrp="1"/>
+          </p:cNvSpPr>
+          <p:nvPr>
+            <p:ph type="title"/>
+          </p:nvPr>
+        </p:nvSpPr>
+        <p:spPr/>
+        <p:txBody>
+          <a:bodyPr/>
+          <a:lstStyle/>
+          <a:p>
+            <a:r>
+              <a:rPr lang="en-US" altLang="ko-KR" dirty="0" smtClean="0"/>
+              <a:t>ESP8266 </a:t>
+            </a:r>
+            <a:r>
+              <a:rPr lang="ko-KR" altLang="en-US" dirty="0" smtClean="0"/>
+              <a:t>코딩 환경 만들기</a:t>
+            </a:r>
+            <a:endParaRPr lang="ko-KR" altLang="en-US" dirty="0"/>
+          </a:p>
+        </p:txBody>
+      </p:sp>
+      <p:sp>
+        <p:nvSpPr>
+          <p:cNvPr id="5" name="슬라이드 번호 개체 틀 4"/>
+          <p:cNvSpPr>
+            <a:spLocks noGrp="1"/>
+          </p:cNvSpPr>
+          <p:nvPr>
+            <p:ph type="sldNum" sz="quarter" idx="12"/>
+          </p:nvPr>
+        </p:nvSpPr>
+        <p:spPr/>
+        <p:txBody>
+          <a:bodyPr/>
+          <a:lstStyle/>
+          <a:p>
+            <a:fld id="{4BEDD84E-25D4-4983-8AA1-2863C96F08D9}" type="slidenum">
+              <a:rPr lang="ko-KR" altLang="en-US" smtClean="0"/>
+              <a:pPr/>
+              <a:t>6</a:t>
             </a:fld>
             <a:endParaRPr lang="ko-KR" altLang="en-US"/>
           </a:p>
@@ -5304,554 +6419,6 @@
 </p:sld>
 </file>
 
-<file path=ppt/slides/slide6.xml><?xml version="1.0" encoding="utf-8"?>
-<p:sld xmlns:a="http://schemas.openxmlformats.org/drawingml/2006/main" xmlns:r="http://schemas.openxmlformats.org/officeDocument/2006/relationships" xmlns:p="http://schemas.openxmlformats.org/presentationml/2006/main">
-  <p:cSld>
-    <p:spTree>
-      <p:nvGrpSpPr>
-        <p:cNvPr id="1" name=""/>
-        <p:cNvGrpSpPr/>
-        <p:nvPr/>
-      </p:nvGrpSpPr>
-      <p:grpSpPr>
-        <a:xfrm>
-          <a:off x="0" y="0"/>
-          <a:ext cx="0" cy="0"/>
-          <a:chOff x="0" y="0"/>
-          <a:chExt cx="0" cy="0"/>
-        </a:xfrm>
-      </p:grpSpPr>
-      <p:sp>
-        <p:nvSpPr>
-          <p:cNvPr id="2" name="제목 1"/>
-          <p:cNvSpPr>
-            <a:spLocks noGrp="1"/>
-          </p:cNvSpPr>
-          <p:nvPr>
-            <p:ph type="title"/>
-          </p:nvPr>
-        </p:nvSpPr>
-        <p:spPr/>
-        <p:txBody>
-          <a:bodyPr/>
-          <a:lstStyle/>
-          <a:p>
-            <a:r>
-              <a:rPr lang="en-US" altLang="ko-KR" dirty="0" smtClean="0"/>
-              <a:t>ESP8266</a:t>
-            </a:r>
-            <a:r>
-              <a:rPr lang="ko-KR" altLang="en-US" dirty="0" smtClean="0"/>
-              <a:t>으로 </a:t>
-            </a:r>
-            <a:r>
-              <a:rPr lang="en-US" altLang="ko-KR" dirty="0" smtClean="0"/>
-              <a:t>TCP </a:t>
-            </a:r>
-            <a:r>
-              <a:rPr lang="ko-KR" altLang="en-US" dirty="0" smtClean="0"/>
-              <a:t>서버 만들기</a:t>
-            </a:r>
-            <a:endParaRPr lang="ko-KR" altLang="en-US" dirty="0"/>
-          </a:p>
-        </p:txBody>
-      </p:sp>
-      <p:sp>
-        <p:nvSpPr>
-          <p:cNvPr id="3" name="내용 개체 틀 2"/>
-          <p:cNvSpPr>
-            <a:spLocks noGrp="1"/>
-          </p:cNvSpPr>
-          <p:nvPr>
-            <p:ph idx="1"/>
-          </p:nvPr>
-        </p:nvSpPr>
-        <p:spPr>
-          <a:xfrm>
-            <a:off x="457200" y="1556792"/>
-            <a:ext cx="8229600" cy="4569371"/>
-          </a:xfrm>
-        </p:spPr>
-        <p:txBody>
-          <a:bodyPr>
-            <a:normAutofit/>
-          </a:bodyPr>
-          <a:lstStyle/>
-          <a:p>
-            <a:pPr>
-              <a:buNone/>
-            </a:pPr>
-            <a:r>
-              <a:rPr lang="ko-KR" altLang="en-US" sz="1800" b="1" dirty="0" smtClean="0"/>
-              <a:t>일반적인 프로젝트 생성 밑 코딩 절차</a:t>
-            </a:r>
-            <a:endParaRPr lang="en-US" altLang="ko-KR" sz="1800" b="1" dirty="0" smtClean="0"/>
-          </a:p>
-          <a:p>
-            <a:pPr>
-              <a:buAutoNum type="arabicPeriod"/>
-            </a:pPr>
-            <a:endParaRPr lang="en-US" altLang="ko-KR" sz="1500" dirty="0" smtClean="0"/>
-          </a:p>
-          <a:p>
-            <a:pPr>
-              <a:buAutoNum type="arabicPeriod"/>
-            </a:pPr>
-            <a:r>
-              <a:rPr lang="en-US" altLang="ko-KR" sz="1500" dirty="0" err="1" smtClean="0"/>
-              <a:t>Shinwook</a:t>
-            </a:r>
-            <a:r>
-              <a:rPr lang="en-US" altLang="ko-KR" sz="1500" dirty="0" smtClean="0"/>
-              <a:t>(</a:t>
-            </a:r>
-            <a:r>
-              <a:rPr lang="ko-KR" altLang="en-US" sz="1500" dirty="0" smtClean="0"/>
-              <a:t>내 작업환경</a:t>
-            </a:r>
-            <a:r>
-              <a:rPr lang="en-US" altLang="ko-KR" sz="1500" dirty="0" smtClean="0"/>
-              <a:t>) </a:t>
-            </a:r>
-            <a:r>
-              <a:rPr lang="ko-KR" altLang="en-US" sz="1500" dirty="0" smtClean="0"/>
-              <a:t>폴더 밑에 </a:t>
-            </a:r>
-            <a:r>
-              <a:rPr lang="en-US" altLang="ko-KR" sz="1500" dirty="0" smtClean="0"/>
-              <a:t>‘</a:t>
-            </a:r>
-            <a:r>
-              <a:rPr lang="en-US" altLang="ko-KR" sz="1500" dirty="0" err="1" smtClean="0"/>
-              <a:t>wifiex</a:t>
-            </a:r>
-            <a:r>
-              <a:rPr lang="en-US" altLang="ko-KR" sz="1500" dirty="0" smtClean="0"/>
-              <a:t>’(</a:t>
-            </a:r>
-            <a:r>
-              <a:rPr lang="ko-KR" altLang="en-US" sz="1500" dirty="0" smtClean="0"/>
-              <a:t>프로젝트 폴더</a:t>
-            </a:r>
-            <a:r>
-              <a:rPr lang="en-US" altLang="ko-KR" sz="1500" smtClean="0"/>
-              <a:t>) </a:t>
-            </a:r>
-            <a:r>
-              <a:rPr lang="ko-KR" altLang="en-US" sz="1500" dirty="0" smtClean="0"/>
-              <a:t>라고 폴더를 만든다</a:t>
-            </a:r>
-            <a:r>
-              <a:rPr lang="en-US" altLang="ko-KR" sz="1500" dirty="0" smtClean="0"/>
-              <a:t>.(</a:t>
-            </a:r>
-            <a:r>
-              <a:rPr lang="ko-KR" altLang="en-US" sz="1500" dirty="0" smtClean="0"/>
-              <a:t>아무 이름이나 상관없다</a:t>
-            </a:r>
-            <a:r>
-              <a:rPr lang="en-US" altLang="ko-KR" sz="1500" dirty="0" smtClean="0"/>
-              <a:t>.)</a:t>
-            </a:r>
-          </a:p>
-          <a:p>
-            <a:pPr>
-              <a:buAutoNum type="arabicPeriod"/>
-            </a:pPr>
-            <a:r>
-              <a:rPr lang="en-US" altLang="ko-KR" sz="1500" dirty="0" err="1" smtClean="0"/>
-              <a:t>Wifiex</a:t>
-            </a:r>
-            <a:r>
-              <a:rPr lang="ko-KR" altLang="en-US" sz="1500" dirty="0" smtClean="0"/>
-              <a:t>폴더로 이동한 뒤 폴더 밑에 </a:t>
-            </a:r>
-            <a:r>
-              <a:rPr lang="en-US" altLang="ko-KR" sz="1500" dirty="0" smtClean="0"/>
-              <a:t>‘user’</a:t>
-            </a:r>
-            <a:r>
-              <a:rPr lang="ko-KR" altLang="en-US" sz="1500" dirty="0" smtClean="0"/>
-              <a:t>이라는 이름의 폴더를 만든다</a:t>
-            </a:r>
-            <a:r>
-              <a:rPr lang="en-US" altLang="ko-KR" sz="1500" dirty="0" smtClean="0"/>
-              <a:t>. </a:t>
-            </a:r>
-            <a:r>
-              <a:rPr lang="ko-KR" altLang="en-US" sz="1500" dirty="0" smtClean="0"/>
-              <a:t>이 폴더의 이름을 바꾸고 싶다면 </a:t>
-            </a:r>
-            <a:r>
-              <a:rPr lang="en-US" altLang="ko-KR" sz="1500" dirty="0" err="1" smtClean="0"/>
-              <a:t>Makefile</a:t>
-            </a:r>
-            <a:r>
-              <a:rPr lang="ko-KR" altLang="en-US" sz="1500" dirty="0" smtClean="0"/>
-              <a:t>에서 </a:t>
-            </a:r>
-            <a:r>
-              <a:rPr lang="en-US" altLang="ko-KR" sz="1500" dirty="0" smtClean="0"/>
-              <a:t>‘MODULES’ </a:t>
-            </a:r>
-            <a:r>
-              <a:rPr lang="ko-KR" altLang="en-US" sz="1500" dirty="0" smtClean="0"/>
-              <a:t>부분을 변경시켜 주어야 한다</a:t>
-            </a:r>
-            <a:r>
-              <a:rPr lang="en-US" altLang="ko-KR" sz="1500" dirty="0" smtClean="0"/>
-              <a:t>. </a:t>
-            </a:r>
-            <a:r>
-              <a:rPr lang="ko-KR" altLang="en-US" sz="1500" dirty="0" smtClean="0"/>
-              <a:t>이 폴더안에 </a:t>
-            </a:r>
-            <a:r>
-              <a:rPr lang="en-US" altLang="ko-KR" sz="1500" dirty="0" smtClean="0"/>
-              <a:t>‘</a:t>
-            </a:r>
-            <a:r>
-              <a:rPr lang="en-US" altLang="ko-KR" sz="1500" dirty="0" err="1" smtClean="0"/>
-              <a:t>user_main.c</a:t>
-            </a:r>
-            <a:r>
-              <a:rPr lang="en-US" altLang="ko-KR" sz="1500" dirty="0" smtClean="0"/>
-              <a:t>’, ‘</a:t>
-            </a:r>
-            <a:r>
-              <a:rPr lang="en-US" altLang="ko-KR" sz="1500" dirty="0" err="1" smtClean="0"/>
-              <a:t>user_config.h</a:t>
-            </a:r>
-            <a:r>
-              <a:rPr lang="en-US" altLang="ko-KR" sz="1500" dirty="0" smtClean="0"/>
-              <a:t>’ </a:t>
-            </a:r>
-            <a:r>
-              <a:rPr lang="ko-KR" altLang="en-US" sz="1500" dirty="0" smtClean="0"/>
-              <a:t>파일을 만든다</a:t>
-            </a:r>
-            <a:r>
-              <a:rPr lang="en-US" altLang="ko-KR" sz="1500" dirty="0" smtClean="0"/>
-              <a:t>. </a:t>
-            </a:r>
-            <a:r>
-              <a:rPr lang="ko-KR" altLang="en-US" sz="1500" dirty="0" smtClean="0"/>
-              <a:t>이 파일들의 이름을 이렇게 고정해주어야 한다</a:t>
-            </a:r>
-            <a:r>
-              <a:rPr lang="en-US" altLang="ko-KR" sz="1500" dirty="0" smtClean="0"/>
-              <a:t>. </a:t>
-            </a:r>
-            <a:r>
-              <a:rPr lang="en-US" altLang="ko-KR" sz="1500" dirty="0" err="1" smtClean="0"/>
-              <a:t>user_main.c</a:t>
-            </a:r>
-            <a:r>
-              <a:rPr lang="en-US" altLang="ko-KR" sz="1500" dirty="0" smtClean="0"/>
-              <a:t> </a:t>
-            </a:r>
-            <a:r>
-              <a:rPr lang="ko-KR" altLang="en-US" sz="1500" dirty="0" smtClean="0"/>
-              <a:t>파일은 </a:t>
-            </a:r>
-            <a:r>
-              <a:rPr lang="en-US" altLang="ko-KR" sz="1500" dirty="0" smtClean="0"/>
-              <a:t>ESP8266</a:t>
-            </a:r>
-            <a:r>
-              <a:rPr lang="ko-KR" altLang="en-US" sz="1500" dirty="0" smtClean="0"/>
-              <a:t>의 자체 컴파일러에서 진입부로 인식하는 함수인 </a:t>
-            </a:r>
-            <a:r>
-              <a:rPr lang="en-US" altLang="ko-KR" sz="1500" dirty="0" err="1" smtClean="0"/>
-              <a:t>user_init</a:t>
-            </a:r>
-            <a:r>
-              <a:rPr lang="ko-KR" altLang="en-US" sz="1500" dirty="0" smtClean="0"/>
-              <a:t>이 정의되어 있다</a:t>
-            </a:r>
-            <a:r>
-              <a:rPr lang="en-US" altLang="ko-KR" sz="1500" dirty="0" smtClean="0"/>
-              <a:t>. </a:t>
-            </a:r>
-            <a:r>
-              <a:rPr lang="ko-KR" altLang="en-US" sz="1500" dirty="0" smtClean="0"/>
-              <a:t>나중에 코딩부분에서 </a:t>
-            </a:r>
-            <a:r>
-              <a:rPr lang="en-US" altLang="ko-KR" sz="1500" dirty="0" err="1" smtClean="0"/>
-              <a:t>user_main.c</a:t>
-            </a:r>
-            <a:r>
-              <a:rPr lang="ko-KR" altLang="en-US" sz="1500" dirty="0" smtClean="0"/>
-              <a:t>부분을 </a:t>
-            </a:r>
-            <a:r>
-              <a:rPr lang="ko-KR" altLang="en-US" sz="1500" dirty="0" err="1" smtClean="0"/>
-              <a:t>코딩하도록</a:t>
-            </a:r>
-            <a:r>
-              <a:rPr lang="ko-KR" altLang="en-US" sz="1500" dirty="0" smtClean="0"/>
-              <a:t> 하겠다</a:t>
-            </a:r>
-            <a:r>
-              <a:rPr lang="en-US" altLang="ko-KR" sz="1500" dirty="0" smtClean="0"/>
-              <a:t>.</a:t>
-            </a:r>
-            <a:r>
-              <a:rPr lang="ko-KR" altLang="en-US" sz="1500" dirty="0" smtClean="0"/>
-              <a:t> </a:t>
-            </a:r>
-            <a:endParaRPr lang="en-US" altLang="ko-KR" sz="1500" dirty="0" smtClean="0"/>
-          </a:p>
-          <a:p>
-            <a:pPr>
-              <a:buAutoNum type="arabicPeriod"/>
-            </a:pPr>
-            <a:r>
-              <a:rPr lang="en-US" altLang="ko-KR" sz="1500" dirty="0" err="1" smtClean="0"/>
-              <a:t>user_main.c</a:t>
-            </a:r>
-            <a:r>
-              <a:rPr lang="en-US" altLang="ko-KR" sz="1500" dirty="0" smtClean="0"/>
-              <a:t> </a:t>
-            </a:r>
-            <a:r>
-              <a:rPr lang="ko-KR" altLang="en-US" sz="1500" dirty="0" smtClean="0"/>
-              <a:t>파일과 </a:t>
-            </a:r>
-            <a:r>
-              <a:rPr lang="en-US" altLang="ko-KR" sz="1500" dirty="0" err="1" smtClean="0"/>
-              <a:t>user_config.h</a:t>
-            </a:r>
-            <a:r>
-              <a:rPr lang="en-US" altLang="ko-KR" sz="1500" dirty="0" smtClean="0"/>
-              <a:t> </a:t>
-            </a:r>
-            <a:r>
-              <a:rPr lang="ko-KR" altLang="en-US" sz="1500" dirty="0" smtClean="0"/>
-              <a:t>파일을 </a:t>
-            </a:r>
-            <a:r>
-              <a:rPr lang="ko-KR" altLang="en-US" sz="1500" dirty="0" err="1" smtClean="0"/>
-              <a:t>코딩한다</a:t>
-            </a:r>
-            <a:r>
-              <a:rPr lang="en-US" altLang="ko-KR" sz="1500" dirty="0" smtClean="0"/>
-              <a:t>. </a:t>
-            </a:r>
-            <a:r>
-              <a:rPr lang="ko-KR" altLang="en-US" sz="1500" dirty="0" smtClean="0"/>
-              <a:t>코딩을 위한 에디터는 </a:t>
-            </a:r>
-            <a:r>
-              <a:rPr lang="en-US" altLang="ko-KR" sz="1500" dirty="0" err="1" smtClean="0"/>
-              <a:t>geany</a:t>
-            </a:r>
-            <a:r>
-              <a:rPr lang="ko-KR" altLang="en-US" sz="1500" dirty="0" smtClean="0"/>
-              <a:t>를 이용한다</a:t>
-            </a:r>
-            <a:r>
-              <a:rPr lang="en-US" altLang="ko-KR" sz="1500" dirty="0" smtClean="0"/>
-              <a:t>. ‘</a:t>
-            </a:r>
-            <a:r>
-              <a:rPr lang="en-US" altLang="ko-KR" sz="1500" dirty="0" err="1" smtClean="0"/>
-              <a:t>sudo</a:t>
-            </a:r>
-            <a:r>
-              <a:rPr lang="en-US" altLang="ko-KR" sz="1500" dirty="0" smtClean="0"/>
-              <a:t> </a:t>
-            </a:r>
-            <a:r>
-              <a:rPr lang="en-US" altLang="ko-KR" sz="1500" dirty="0" err="1" smtClean="0"/>
-              <a:t>geany</a:t>
-            </a:r>
-            <a:r>
-              <a:rPr lang="en-US" altLang="ko-KR" sz="1500" dirty="0" smtClean="0"/>
-              <a:t> </a:t>
-            </a:r>
-            <a:r>
-              <a:rPr lang="ko-KR" altLang="en-US" sz="1500" dirty="0" smtClean="0"/>
-              <a:t>파일명</a:t>
-            </a:r>
-            <a:r>
-              <a:rPr lang="en-US" altLang="ko-KR" sz="1500" dirty="0" smtClean="0"/>
-              <a:t>’ </a:t>
-            </a:r>
-            <a:r>
-              <a:rPr lang="ko-KR" altLang="en-US" sz="1500" dirty="0" smtClean="0"/>
-              <a:t>명령을 입력하면 파일 코딩이 가능해진다</a:t>
-            </a:r>
-            <a:r>
-              <a:rPr lang="en-US" altLang="ko-KR" sz="1500" dirty="0" smtClean="0"/>
-              <a:t>. </a:t>
-            </a:r>
-            <a:r>
-              <a:rPr lang="ko-KR" altLang="en-US" sz="1500" dirty="0" smtClean="0"/>
-              <a:t>코딩이 끝나면 저장만 하고 종료한다</a:t>
-            </a:r>
-            <a:r>
-              <a:rPr lang="en-US" altLang="ko-KR" sz="1500" dirty="0" smtClean="0"/>
-              <a:t>.</a:t>
-            </a:r>
-          </a:p>
-          <a:p>
-            <a:pPr>
-              <a:buAutoNum type="arabicPeriod"/>
-            </a:pPr>
-            <a:r>
-              <a:rPr lang="en-US" altLang="ko-KR" sz="1500" dirty="0" err="1" smtClean="0"/>
-              <a:t>shinwook</a:t>
-            </a:r>
-            <a:r>
-              <a:rPr lang="en-US" altLang="ko-KR" sz="1500" dirty="0" smtClean="0"/>
-              <a:t> </a:t>
-            </a:r>
-            <a:r>
-              <a:rPr lang="ko-KR" altLang="en-US" sz="1500" dirty="0" smtClean="0"/>
-              <a:t>폴더로 다시 이동한 뒤 </a:t>
-            </a:r>
-            <a:r>
-              <a:rPr lang="en-US" altLang="ko-KR" sz="1500" dirty="0" smtClean="0"/>
-              <a:t>‘make clean ; make’ </a:t>
-            </a:r>
-            <a:r>
-              <a:rPr lang="ko-KR" altLang="en-US" sz="1500" dirty="0" smtClean="0"/>
-              <a:t>명령을 입력한다</a:t>
-            </a:r>
-            <a:r>
-              <a:rPr lang="en-US" altLang="ko-KR" sz="1500" dirty="0" smtClean="0"/>
-              <a:t>. </a:t>
-            </a:r>
-            <a:r>
-              <a:rPr lang="ko-KR" altLang="en-US" sz="1500" dirty="0" smtClean="0"/>
-              <a:t>그러면 </a:t>
-            </a:r>
-            <a:r>
-              <a:rPr lang="ko-KR" altLang="en-US" sz="1500" dirty="0" err="1" smtClean="0"/>
-              <a:t>기계어로된</a:t>
-            </a:r>
-            <a:r>
-              <a:rPr lang="ko-KR" altLang="en-US" sz="1500" dirty="0" smtClean="0"/>
-              <a:t> </a:t>
-            </a:r>
-            <a:r>
-              <a:rPr lang="en-US" altLang="ko-KR" sz="1500" dirty="0" smtClean="0"/>
-              <a:t>‘0x00000.bin’, ‘0x40000.bin’ </a:t>
-            </a:r>
-            <a:r>
-              <a:rPr lang="ko-KR" altLang="en-US" sz="1500" dirty="0" smtClean="0"/>
-              <a:t>파일들이 만들어진다</a:t>
-            </a:r>
-            <a:r>
-              <a:rPr lang="en-US" altLang="ko-KR" sz="1500" dirty="0" smtClean="0"/>
-              <a:t>. </a:t>
-            </a:r>
-            <a:r>
-              <a:rPr lang="ko-KR" altLang="en-US" sz="1500" dirty="0" smtClean="0"/>
-              <a:t>이 파일들을 이제 업로드 해야한다</a:t>
-            </a:r>
-            <a:r>
-              <a:rPr lang="en-US" altLang="ko-KR" sz="1500" dirty="0" smtClean="0"/>
-              <a:t>. </a:t>
-            </a:r>
-          </a:p>
-          <a:p>
-            <a:pPr>
-              <a:buAutoNum type="arabicPeriod"/>
-            </a:pPr>
-            <a:r>
-              <a:rPr lang="ko-KR" altLang="en-US" sz="1500" dirty="0" smtClean="0"/>
-              <a:t>명령어를 타이핑하면 업로드가 시작된다</a:t>
-            </a:r>
-            <a:r>
-              <a:rPr lang="en-US" altLang="ko-KR" sz="1500" dirty="0" smtClean="0"/>
-              <a:t>. </a:t>
-            </a:r>
-            <a:r>
-              <a:rPr lang="ko-KR" altLang="en-US" sz="1500" dirty="0" smtClean="0"/>
-              <a:t>업로드를 하기 전에 </a:t>
-            </a:r>
-            <a:r>
-              <a:rPr lang="en-US" altLang="ko-KR" sz="1500" dirty="0" smtClean="0"/>
-              <a:t>ESP8266</a:t>
-            </a:r>
-            <a:r>
-              <a:rPr lang="ko-KR" altLang="en-US" sz="1500" dirty="0" smtClean="0"/>
-              <a:t>개발보드를 </a:t>
-            </a:r>
-            <a:r>
-              <a:rPr lang="ko-KR" altLang="en-US" sz="1500" dirty="0" err="1" smtClean="0"/>
-              <a:t>셋팅해야한다</a:t>
-            </a:r>
-            <a:r>
-              <a:rPr lang="en-US" altLang="ko-KR" sz="1500" dirty="0" smtClean="0"/>
-              <a:t>. </a:t>
-            </a:r>
-            <a:r>
-              <a:rPr lang="ko-KR" altLang="en-US" sz="1500" dirty="0" smtClean="0"/>
-              <a:t>나중에 업로드 과정에서 설명하도록 하겠다</a:t>
-            </a:r>
-            <a:r>
-              <a:rPr lang="en-US" altLang="ko-KR" sz="1500" dirty="0" smtClean="0"/>
-              <a:t>.</a:t>
-            </a:r>
-          </a:p>
-          <a:p>
-            <a:pPr>
-              <a:buAutoNum type="arabicPeriod"/>
-            </a:pPr>
-            <a:endParaRPr lang="en-US" altLang="ko-KR" sz="1500" dirty="0" smtClean="0"/>
-          </a:p>
-          <a:p>
-            <a:pPr>
-              <a:buAutoNum type="arabicPeriod"/>
-            </a:pPr>
-            <a:endParaRPr lang="ko-KR" altLang="en-US" sz="1500" dirty="0"/>
-          </a:p>
-        </p:txBody>
-      </p:sp>
-      <p:sp>
-        <p:nvSpPr>
-          <p:cNvPr id="5" name="슬라이드 번호 개체 틀 4"/>
-          <p:cNvSpPr>
-            <a:spLocks noGrp="1"/>
-          </p:cNvSpPr>
-          <p:nvPr>
-            <p:ph type="sldNum" sz="quarter" idx="12"/>
-          </p:nvPr>
-        </p:nvSpPr>
-        <p:spPr/>
-        <p:txBody>
-          <a:bodyPr/>
-          <a:lstStyle/>
-          <a:p>
-            <a:fld id="{4BEDD84E-25D4-4983-8AA1-2863C96F08D9}" type="slidenum">
-              <a:rPr lang="ko-KR" altLang="en-US" smtClean="0"/>
-              <a:pPr/>
-              <a:t>6</a:t>
-            </a:fld>
-            <a:endParaRPr lang="ko-KR" altLang="en-US"/>
-          </a:p>
-        </p:txBody>
-      </p:sp>
-    </p:spTree>
-  </p:cSld>
-  <p:clrMapOvr>
-    <a:masterClrMapping/>
-  </p:clrMapOvr>
-  <p:timing>
-    <p:tnLst>
-      <p:par>
-        <p:cTn id="1" dur="indefinite" restart="never" nodeType="tmRoot"/>
-      </p:par>
-    </p:tnLst>
-  </p:timing>
-</p:sld>
-</file>
-
 <file path=ppt/slides/slide7.xml><?xml version="1.0" encoding="utf-8"?>
 <p:sld xmlns:a="http://schemas.openxmlformats.org/drawingml/2006/main" xmlns:r="http://schemas.openxmlformats.org/officeDocument/2006/relationships" xmlns:p="http://schemas.openxmlformats.org/presentationml/2006/main">
   <p:cSld>
@@ -5871,18 +6438,53 @@
       </p:grpSpPr>
       <p:sp>
         <p:nvSpPr>
-          <p:cNvPr id="6" name="제목 1"/>
+          <p:cNvPr id="2" name="제목 1"/>
           <p:cNvSpPr>
             <a:spLocks noGrp="1"/>
           </p:cNvSpPr>
           <p:nvPr>
             <p:ph type="title"/>
+          </p:nvPr>
+        </p:nvSpPr>
+        <p:spPr/>
+        <p:txBody>
+          <a:bodyPr/>
+          <a:lstStyle/>
+          <a:p>
+            <a:r>
+              <a:rPr lang="en-US" altLang="ko-KR" dirty="0" smtClean="0"/>
+              <a:t>ESP8266</a:t>
+            </a:r>
+            <a:r>
+              <a:rPr lang="ko-KR" altLang="en-US" dirty="0" smtClean="0"/>
+              <a:t>으로 </a:t>
+            </a:r>
+            <a:r>
+              <a:rPr lang="en-US" altLang="ko-KR" dirty="0" smtClean="0"/>
+              <a:t>TCP </a:t>
+            </a:r>
+            <a:r>
+              <a:rPr lang="ko-KR" altLang="en-US" dirty="0" smtClean="0"/>
+              <a:t>서버 만들기</a:t>
+            </a:r>
+            <a:endParaRPr lang="ko-KR" altLang="en-US" dirty="0"/>
+          </a:p>
+        </p:txBody>
+      </p:sp>
+      <p:sp>
+        <p:nvSpPr>
+          <p:cNvPr id="3" name="내용 개체 틀 2"/>
+          <p:cNvSpPr>
+            <a:spLocks noGrp="1"/>
+          </p:cNvSpPr>
+          <p:nvPr>
+            <p:ph idx="1"/>
           </p:nvPr>
         </p:nvSpPr>
         <p:spPr>
           <a:xfrm>
-            <a:off x="4561656" y="274638"/>
-            <a:ext cx="4114800" cy="490066"/>
+            <a:off x="457200" y="1556792"/>
+            <a:ext cx="8229600" cy="4569371"/>
           </a:xfrm>
         </p:spPr>
         <p:txBody>
@@ -5891,23 +6493,438 @@
           </a:bodyPr>
           <a:lstStyle/>
           <a:p>
-            <a:r>
-              <a:rPr lang="en-US" altLang="ko-KR" dirty="0" smtClean="0"/>
+            <a:pPr>
+              <a:buNone/>
+            </a:pPr>
+            <a:r>
+              <a:rPr lang="ko-KR" altLang="en-US" sz="1800" b="1" dirty="0" smtClean="0"/>
+              <a:t>일반적인 프로젝트 생성 밑 코딩 절차</a:t>
+            </a:r>
+            <a:endParaRPr lang="en-US" altLang="ko-KR" sz="1800" b="1" dirty="0" smtClean="0"/>
+          </a:p>
+          <a:p>
+            <a:pPr>
+              <a:buAutoNum type="arabicPeriod"/>
+            </a:pPr>
+            <a:endParaRPr lang="en-US" altLang="ko-KR" sz="1500" dirty="0" smtClean="0"/>
+          </a:p>
+          <a:p>
+            <a:pPr>
+              <a:buAutoNum type="arabicPeriod"/>
+            </a:pPr>
+            <a:r>
+              <a:rPr lang="en-US" altLang="ko-KR" sz="1500" dirty="0" err="1" smtClean="0"/>
+              <a:t>Shinwook</a:t>
+            </a:r>
+            <a:r>
+              <a:rPr lang="en-US" altLang="ko-KR" sz="1500" dirty="0" smtClean="0"/>
+              <a:t>(</a:t>
+            </a:r>
+            <a:r>
+              <a:rPr lang="ko-KR" altLang="en-US" sz="1500" dirty="0" smtClean="0"/>
+              <a:t>내 작업환경</a:t>
+            </a:r>
+            <a:r>
+              <a:rPr lang="en-US" altLang="ko-KR" sz="1500" dirty="0" smtClean="0"/>
+              <a:t>) </a:t>
+            </a:r>
+            <a:r>
+              <a:rPr lang="ko-KR" altLang="en-US" sz="1500" dirty="0" smtClean="0"/>
+              <a:t>폴더 밑에 </a:t>
+            </a:r>
+            <a:r>
+              <a:rPr lang="en-US" altLang="ko-KR" sz="1500" dirty="0" smtClean="0"/>
+              <a:t>‘</a:t>
+            </a:r>
+            <a:r>
+              <a:rPr lang="en-US" altLang="ko-KR" sz="1500" dirty="0" err="1" smtClean="0"/>
+              <a:t>wifiex</a:t>
+            </a:r>
+            <a:r>
+              <a:rPr lang="en-US" altLang="ko-KR" sz="1500" dirty="0" smtClean="0"/>
+              <a:t>’(</a:t>
+            </a:r>
+            <a:r>
+              <a:rPr lang="ko-KR" altLang="en-US" sz="1500" dirty="0" smtClean="0"/>
+              <a:t>프로젝트 폴더</a:t>
+            </a:r>
+            <a:r>
+              <a:rPr lang="en-US" altLang="ko-KR" sz="1500" dirty="0" smtClean="0"/>
+              <a:t>) </a:t>
+            </a:r>
+            <a:r>
+              <a:rPr lang="ko-KR" altLang="en-US" sz="1500" dirty="0" smtClean="0"/>
+              <a:t>라고 폴더를 만든다</a:t>
+            </a:r>
+            <a:r>
+              <a:rPr lang="en-US" altLang="ko-KR" sz="1500" dirty="0" smtClean="0"/>
+              <a:t>.(</a:t>
+            </a:r>
+            <a:r>
+              <a:rPr lang="ko-KR" altLang="en-US" sz="1500" dirty="0" smtClean="0"/>
+              <a:t>아무 이름이나 상관없다</a:t>
+            </a:r>
+            <a:r>
+              <a:rPr lang="en-US" altLang="ko-KR" sz="1500" dirty="0" smtClean="0"/>
+              <a:t>.)</a:t>
+            </a:r>
+          </a:p>
+          <a:p>
+            <a:pPr>
+              <a:buAutoNum type="arabicPeriod"/>
+            </a:pPr>
+            <a:r>
+              <a:rPr lang="en-US" altLang="ko-KR" sz="1500" dirty="0" err="1" smtClean="0"/>
+              <a:t>Wifiex</a:t>
+            </a:r>
+            <a:r>
+              <a:rPr lang="ko-KR" altLang="en-US" sz="1500" dirty="0" smtClean="0"/>
+              <a:t>폴더로 이동한 뒤 폴더 밑에 </a:t>
+            </a:r>
+            <a:r>
+              <a:rPr lang="en-US" altLang="ko-KR" sz="1500" dirty="0" smtClean="0"/>
+              <a:t>‘user’</a:t>
+            </a:r>
+            <a:r>
+              <a:rPr lang="ko-KR" altLang="en-US" sz="1500" dirty="0" smtClean="0"/>
+              <a:t>이라는 이름의 폴더를 만든다</a:t>
+            </a:r>
+            <a:r>
+              <a:rPr lang="en-US" altLang="ko-KR" sz="1500" dirty="0" smtClean="0"/>
+              <a:t>. </a:t>
+            </a:r>
+            <a:r>
+              <a:rPr lang="ko-KR" altLang="en-US" sz="1500" dirty="0" smtClean="0"/>
+              <a:t>이 폴더의 이름을 바꾸고 싶다면 </a:t>
+            </a:r>
+            <a:r>
+              <a:rPr lang="en-US" altLang="ko-KR" sz="1500" dirty="0" err="1" smtClean="0"/>
+              <a:t>Makefile</a:t>
+            </a:r>
+            <a:r>
+              <a:rPr lang="ko-KR" altLang="en-US" sz="1500" dirty="0" smtClean="0"/>
+              <a:t>에서 </a:t>
+            </a:r>
+            <a:r>
+              <a:rPr lang="en-US" altLang="ko-KR" sz="1500" dirty="0" smtClean="0"/>
+              <a:t>‘MODULES’ </a:t>
+            </a:r>
+            <a:r>
+              <a:rPr lang="ko-KR" altLang="en-US" sz="1500" dirty="0" smtClean="0"/>
+              <a:t>부분을 변경시켜 주어야 한다</a:t>
+            </a:r>
+            <a:r>
+              <a:rPr lang="en-US" altLang="ko-KR" sz="1500" dirty="0" smtClean="0"/>
+              <a:t>. </a:t>
+            </a:r>
+            <a:r>
+              <a:rPr lang="ko-KR" altLang="en-US" sz="1500" dirty="0" smtClean="0"/>
+              <a:t>이 폴더안에 </a:t>
+            </a:r>
+            <a:r>
+              <a:rPr lang="en-US" altLang="ko-KR" sz="1500" dirty="0" smtClean="0"/>
+              <a:t>‘</a:t>
+            </a:r>
+            <a:r>
+              <a:rPr lang="en-US" altLang="ko-KR" sz="1500" dirty="0" err="1" smtClean="0"/>
+              <a:t>user_main.c</a:t>
+            </a:r>
+            <a:r>
+              <a:rPr lang="en-US" altLang="ko-KR" sz="1500" dirty="0" smtClean="0"/>
+              <a:t>’, ‘</a:t>
+            </a:r>
+            <a:r>
+              <a:rPr lang="en-US" altLang="ko-KR" sz="1500" dirty="0" err="1" smtClean="0"/>
+              <a:t>user_config.h</a:t>
+            </a:r>
+            <a:r>
+              <a:rPr lang="en-US" altLang="ko-KR" sz="1500" dirty="0" smtClean="0"/>
+              <a:t>’ </a:t>
+            </a:r>
+            <a:r>
+              <a:rPr lang="ko-KR" altLang="en-US" sz="1500" dirty="0" smtClean="0"/>
+              <a:t>파일을 만든다</a:t>
+            </a:r>
+            <a:r>
+              <a:rPr lang="en-US" altLang="ko-KR" sz="1500" dirty="0" smtClean="0"/>
+              <a:t>. </a:t>
+            </a:r>
+            <a:r>
+              <a:rPr lang="ko-KR" altLang="en-US" sz="1500" dirty="0" smtClean="0"/>
+              <a:t>이 파일들의 이름을 이렇게 고정해주어야 한다</a:t>
+            </a:r>
+            <a:r>
+              <a:rPr lang="en-US" altLang="ko-KR" sz="1500" dirty="0" smtClean="0"/>
+              <a:t>. </a:t>
+            </a:r>
+            <a:r>
+              <a:rPr lang="en-US" altLang="ko-KR" sz="1500" dirty="0" err="1" smtClean="0"/>
+              <a:t>user_main.c</a:t>
+            </a:r>
+            <a:r>
+              <a:rPr lang="en-US" altLang="ko-KR" sz="1500" dirty="0" smtClean="0"/>
+              <a:t> </a:t>
+            </a:r>
+            <a:r>
+              <a:rPr lang="ko-KR" altLang="en-US" sz="1500" dirty="0" smtClean="0"/>
+              <a:t>파일은 </a:t>
+            </a:r>
+            <a:r>
+              <a:rPr lang="en-US" altLang="ko-KR" sz="1500" dirty="0" smtClean="0"/>
               <a:t>ESP8266</a:t>
             </a:r>
             <a:r>
-              <a:rPr lang="ko-KR" altLang="en-US" dirty="0" smtClean="0"/>
-              <a:t>으로 </a:t>
-            </a:r>
-            <a:r>
-              <a:rPr lang="en-US" altLang="ko-KR" dirty="0" smtClean="0"/>
-              <a:t>TCP </a:t>
-            </a:r>
-            <a:r>
-              <a:rPr lang="ko-KR" altLang="en-US" dirty="0" smtClean="0"/>
-              <a:t>서버 만들기</a:t>
-            </a:r>
-            <a:endParaRPr lang="ko-KR" altLang="en-US" dirty="0"/>
+              <a:rPr lang="ko-KR" altLang="en-US" sz="1500" dirty="0" smtClean="0"/>
+              <a:t>의 자체 컴파일러에서 진입부로 인식하는 함수인 </a:t>
+            </a:r>
+            <a:r>
+              <a:rPr lang="en-US" altLang="ko-KR" sz="1500" dirty="0" err="1" smtClean="0"/>
+              <a:t>user_init</a:t>
+            </a:r>
+            <a:r>
+              <a:rPr lang="ko-KR" altLang="en-US" sz="1500" dirty="0" smtClean="0"/>
+              <a:t>이 정의되어 있다</a:t>
+            </a:r>
+            <a:r>
+              <a:rPr lang="en-US" altLang="ko-KR" sz="1500" dirty="0" smtClean="0"/>
+              <a:t>. </a:t>
+            </a:r>
+            <a:r>
+              <a:rPr lang="ko-KR" altLang="en-US" sz="1500" dirty="0" smtClean="0"/>
+              <a:t>나중에 코딩부분에서 </a:t>
+            </a:r>
+            <a:r>
+              <a:rPr lang="en-US" altLang="ko-KR" sz="1500" dirty="0" err="1" smtClean="0"/>
+              <a:t>user_main.c</a:t>
+            </a:r>
+            <a:r>
+              <a:rPr lang="ko-KR" altLang="en-US" sz="1500" dirty="0" smtClean="0"/>
+              <a:t>부분을 </a:t>
+            </a:r>
+            <a:r>
+              <a:rPr lang="ko-KR" altLang="en-US" sz="1500" dirty="0" err="1" smtClean="0"/>
+              <a:t>코딩하도록</a:t>
+            </a:r>
+            <a:r>
+              <a:rPr lang="ko-KR" altLang="en-US" sz="1500" dirty="0" smtClean="0"/>
+              <a:t> 하겠다</a:t>
+            </a:r>
+            <a:r>
+              <a:rPr lang="en-US" altLang="ko-KR" sz="1500" dirty="0" smtClean="0"/>
+              <a:t>.</a:t>
+            </a:r>
+            <a:r>
+              <a:rPr lang="ko-KR" altLang="en-US" sz="1500" dirty="0" smtClean="0"/>
+              <a:t> </a:t>
+            </a:r>
+            <a:endParaRPr lang="en-US" altLang="ko-KR" sz="1500" dirty="0" smtClean="0"/>
+          </a:p>
+          <a:p>
+            <a:pPr>
+              <a:buAutoNum type="arabicPeriod"/>
+            </a:pPr>
+            <a:r>
+              <a:rPr lang="en-US" altLang="ko-KR" sz="1500" dirty="0" err="1" smtClean="0"/>
+              <a:t>user_main.c</a:t>
+            </a:r>
+            <a:r>
+              <a:rPr lang="en-US" altLang="ko-KR" sz="1500" dirty="0" smtClean="0"/>
+              <a:t> </a:t>
+            </a:r>
+            <a:r>
+              <a:rPr lang="ko-KR" altLang="en-US" sz="1500" dirty="0" smtClean="0"/>
+              <a:t>파일과 </a:t>
+            </a:r>
+            <a:r>
+              <a:rPr lang="en-US" altLang="ko-KR" sz="1500" dirty="0" err="1" smtClean="0"/>
+              <a:t>user_config.h</a:t>
+            </a:r>
+            <a:r>
+              <a:rPr lang="en-US" altLang="ko-KR" sz="1500" dirty="0" smtClean="0"/>
+              <a:t> </a:t>
+            </a:r>
+            <a:r>
+              <a:rPr lang="ko-KR" altLang="en-US" sz="1500" dirty="0" smtClean="0"/>
+              <a:t>파일을 </a:t>
+            </a:r>
+            <a:r>
+              <a:rPr lang="ko-KR" altLang="en-US" sz="1500" dirty="0" err="1" smtClean="0"/>
+              <a:t>코딩한다</a:t>
+            </a:r>
+            <a:r>
+              <a:rPr lang="en-US" altLang="ko-KR" sz="1500" dirty="0" smtClean="0"/>
+              <a:t>. </a:t>
+            </a:r>
+            <a:r>
+              <a:rPr lang="ko-KR" altLang="en-US" sz="1500" dirty="0" smtClean="0"/>
+              <a:t>코딩을 위한 에디터는 </a:t>
+            </a:r>
+            <a:r>
+              <a:rPr lang="en-US" altLang="ko-KR" sz="1500" dirty="0" err="1" smtClean="0"/>
+              <a:t>geany</a:t>
+            </a:r>
+            <a:r>
+              <a:rPr lang="ko-KR" altLang="en-US" sz="1500" dirty="0" smtClean="0"/>
+              <a:t>를 이용한다</a:t>
+            </a:r>
+            <a:r>
+              <a:rPr lang="en-US" altLang="ko-KR" sz="1500" dirty="0" smtClean="0"/>
+              <a:t>. ‘</a:t>
+            </a:r>
+            <a:r>
+              <a:rPr lang="en-US" altLang="ko-KR" sz="1500" dirty="0" err="1" smtClean="0"/>
+              <a:t>sudo</a:t>
+            </a:r>
+            <a:r>
+              <a:rPr lang="en-US" altLang="ko-KR" sz="1500" dirty="0" smtClean="0"/>
+              <a:t> </a:t>
+            </a:r>
+            <a:r>
+              <a:rPr lang="en-US" altLang="ko-KR" sz="1500" dirty="0" err="1" smtClean="0"/>
+              <a:t>geany</a:t>
+            </a:r>
+            <a:r>
+              <a:rPr lang="en-US" altLang="ko-KR" sz="1500" dirty="0" smtClean="0"/>
+              <a:t> </a:t>
+            </a:r>
+            <a:r>
+              <a:rPr lang="ko-KR" altLang="en-US" sz="1500" dirty="0" smtClean="0"/>
+              <a:t>파일명</a:t>
+            </a:r>
+            <a:r>
+              <a:rPr lang="en-US" altLang="ko-KR" sz="1500" dirty="0" smtClean="0"/>
+              <a:t>’ </a:t>
+            </a:r>
+            <a:r>
+              <a:rPr lang="ko-KR" altLang="en-US" sz="1500" dirty="0" smtClean="0"/>
+              <a:t>명령을 입력하면 파일 코딩이 가능해진다</a:t>
+            </a:r>
+            <a:r>
+              <a:rPr lang="en-US" altLang="ko-KR" sz="1500" dirty="0" smtClean="0"/>
+              <a:t>. </a:t>
+            </a:r>
+            <a:r>
+              <a:rPr lang="ko-KR" altLang="en-US" sz="1500" dirty="0" smtClean="0"/>
+              <a:t>코딩이 끝나면 저장만 하고 종료한다</a:t>
+            </a:r>
+            <a:r>
+              <a:rPr lang="en-US" altLang="ko-KR" sz="1500" dirty="0" smtClean="0"/>
+              <a:t>.</a:t>
+            </a:r>
+          </a:p>
+          <a:p>
+            <a:pPr>
+              <a:buAutoNum type="arabicPeriod"/>
+            </a:pPr>
+            <a:r>
+              <a:rPr lang="en-US" altLang="ko-KR" sz="1500" dirty="0" err="1" smtClean="0"/>
+              <a:t>shinwook</a:t>
+            </a:r>
+            <a:r>
+              <a:rPr lang="en-US" altLang="ko-KR" sz="1500" dirty="0" smtClean="0"/>
+              <a:t> </a:t>
+            </a:r>
+            <a:r>
+              <a:rPr lang="ko-KR" altLang="en-US" sz="1500" dirty="0" smtClean="0"/>
+              <a:t>폴더로 다시 이동한 뒤 </a:t>
+            </a:r>
+            <a:r>
+              <a:rPr lang="en-US" altLang="ko-KR" sz="1500" dirty="0" smtClean="0"/>
+              <a:t>‘make clean ; make’ </a:t>
+            </a:r>
+            <a:r>
+              <a:rPr lang="ko-KR" altLang="en-US" sz="1500" dirty="0" smtClean="0"/>
+              <a:t>명령을 입력한다</a:t>
+            </a:r>
+            <a:r>
+              <a:rPr lang="en-US" altLang="ko-KR" sz="1500" dirty="0" smtClean="0"/>
+              <a:t>. </a:t>
+            </a:r>
+            <a:r>
+              <a:rPr lang="ko-KR" altLang="en-US" sz="1500" dirty="0" smtClean="0"/>
+              <a:t>그러면 </a:t>
+            </a:r>
+            <a:r>
+              <a:rPr lang="ko-KR" altLang="en-US" sz="1500" dirty="0" err="1" smtClean="0"/>
+              <a:t>기계어로된</a:t>
+            </a:r>
+            <a:r>
+              <a:rPr lang="ko-KR" altLang="en-US" sz="1500" dirty="0" smtClean="0"/>
+              <a:t> </a:t>
+            </a:r>
+            <a:r>
+              <a:rPr lang="en-US" altLang="ko-KR" sz="1500" dirty="0" smtClean="0"/>
+              <a:t>‘0x00000.bin’, ‘0x40000.bin’ </a:t>
+            </a:r>
+            <a:r>
+              <a:rPr lang="ko-KR" altLang="en-US" sz="1500" dirty="0" smtClean="0"/>
+              <a:t>파일들이 만들어진다</a:t>
+            </a:r>
+            <a:r>
+              <a:rPr lang="en-US" altLang="ko-KR" sz="1500" dirty="0" smtClean="0"/>
+              <a:t>. </a:t>
+            </a:r>
+            <a:r>
+              <a:rPr lang="ko-KR" altLang="en-US" sz="1500" dirty="0" smtClean="0"/>
+              <a:t>이 파일들을 이제 업로드 해야한다</a:t>
+            </a:r>
+            <a:r>
+              <a:rPr lang="en-US" altLang="ko-KR" sz="1500" dirty="0" smtClean="0"/>
+              <a:t>. </a:t>
+            </a:r>
+          </a:p>
+          <a:p>
+            <a:pPr>
+              <a:buAutoNum type="arabicPeriod"/>
+            </a:pPr>
+            <a:r>
+              <a:rPr lang="ko-KR" altLang="en-US" sz="1500" dirty="0" smtClean="0"/>
+              <a:t>명령어를 타이핑하면 업로드가 시작된다</a:t>
+            </a:r>
+            <a:r>
+              <a:rPr lang="en-US" altLang="ko-KR" sz="1500" dirty="0" smtClean="0"/>
+              <a:t>. </a:t>
+            </a:r>
+            <a:r>
+              <a:rPr lang="ko-KR" altLang="en-US" sz="1500" dirty="0" smtClean="0"/>
+              <a:t>업로드를 하기 전에 </a:t>
+            </a:r>
+            <a:r>
+              <a:rPr lang="en-US" altLang="ko-KR" sz="1500" dirty="0" smtClean="0"/>
+              <a:t>ESP8266</a:t>
+            </a:r>
+            <a:r>
+              <a:rPr lang="ko-KR" altLang="en-US" sz="1500" dirty="0" smtClean="0"/>
+              <a:t>개발보드를 </a:t>
+            </a:r>
+            <a:r>
+              <a:rPr lang="ko-KR" altLang="en-US" sz="1500" dirty="0" err="1" smtClean="0"/>
+              <a:t>셋팅해야한다</a:t>
+            </a:r>
+            <a:r>
+              <a:rPr lang="en-US" altLang="ko-KR" sz="1500" dirty="0" smtClean="0"/>
+              <a:t>. </a:t>
+            </a:r>
+            <a:r>
+              <a:rPr lang="ko-KR" altLang="en-US" sz="1500" dirty="0" smtClean="0"/>
+              <a:t>나중에 업로드 과정에서 설명하도록 하겠다</a:t>
+            </a:r>
+            <a:r>
+              <a:rPr lang="en-US" altLang="ko-KR" sz="1500" dirty="0" smtClean="0"/>
+              <a:t>.</a:t>
+            </a:r>
+          </a:p>
+          <a:p>
+            <a:pPr>
+              <a:buAutoNum type="arabicPeriod"/>
+            </a:pPr>
+            <a:endParaRPr lang="en-US" altLang="ko-KR" sz="1500" dirty="0" smtClean="0"/>
+          </a:p>
+          <a:p>
+            <a:pPr>
+              <a:buAutoNum type="arabicPeriod"/>
+            </a:pPr>
+            <a:endParaRPr lang="ko-KR" altLang="en-US" sz="1500" dirty="0"/>
           </a:p>
         </p:txBody>
       </p:sp>
@@ -5932,39 +6949,6 @@
               <a:t>7</a:t>
             </a:fld>
             <a:endParaRPr lang="ko-KR" altLang="en-US"/>
-          </a:p>
-        </p:txBody>
-      </p:sp>
-      <p:sp>
-        <p:nvSpPr>
-          <p:cNvPr id="8" name="내용 개체 틀 7"/>
-          <p:cNvSpPr>
-            <a:spLocks noGrp="1"/>
-          </p:cNvSpPr>
-          <p:nvPr>
-            <p:ph idx="1"/>
-          </p:nvPr>
-        </p:nvSpPr>
-        <p:spPr>
-          <a:xfrm>
-            <a:off x="467544" y="2996952"/>
-            <a:ext cx="8229600" cy="936104"/>
-          </a:xfrm>
-        </p:spPr>
-        <p:txBody>
-          <a:bodyPr/>
-          <a:lstStyle/>
-          <a:p>
-            <a:pPr algn="ctr"/>
-            <a:r>
-              <a:rPr lang="en-US" altLang="ko-KR" dirty="0" smtClean="0"/>
-              <a:t>ESP8266 TCP </a:t>
-            </a:r>
-            <a:r>
-              <a:rPr lang="ko-KR" altLang="en-US" dirty="0" smtClean="0"/>
-              <a:t>서버 코드 그림</a:t>
-            </a:r>
-            <a:endParaRPr lang="ko-KR" altLang="en-US" dirty="0"/>
           </a:p>
         </p:txBody>
       </p:sp>
@@ -6002,7 +6986,7 @@
       </p:grpSpPr>
       <p:sp>
         <p:nvSpPr>
-          <p:cNvPr id="3" name="슬라이드 번호 개체 틀 2"/>
+          <p:cNvPr id="4" name="슬라이드 번호 개체 틀 3"/>
           <p:cNvSpPr>
             <a:spLocks noGrp="1"/>
           </p:cNvSpPr>
@@ -6020,7 +7004,7 @@
               <a:pPr/>
               <a:t>8</a:t>
             </a:fld>
-            <a:endParaRPr lang="ko-KR" altLang="en-US" dirty="0"/>
+            <a:endParaRPr lang="ko-KR" altLang="en-US"/>
           </a:p>
         </p:txBody>
       </p:sp>
@@ -6066,66 +7050,13 @@
           </a:p>
         </p:txBody>
       </p:sp>
-      <p:sp>
-        <p:nvSpPr>
-          <p:cNvPr id="9" name="TextBox 8"/>
-          <p:cNvSpPr txBox="1"/>
-          <p:nvPr/>
-        </p:nvSpPr>
-        <p:spPr>
-          <a:xfrm>
-            <a:off x="2123728" y="4509120"/>
-            <a:ext cx="5040560" cy="369332"/>
-          </a:xfrm>
-          <a:prstGeom prst="rect">
-            <a:avLst/>
-          </a:prstGeom>
-          <a:noFill/>
-        </p:spPr>
-        <p:txBody>
-          <a:bodyPr wrap="square" rtlCol="0">
-            <a:spAutoFit/>
-          </a:bodyPr>
-          <a:lstStyle/>
-          <a:p>
-            <a:pPr algn="ctr"/>
-            <a:r>
-              <a:rPr lang="en-US" altLang="ko-KR" dirty="0" smtClean="0"/>
-              <a:t>Make </a:t>
-            </a:r>
-            <a:r>
-              <a:rPr lang="ko-KR" altLang="en-US" dirty="0" smtClean="0"/>
-              <a:t>성공 후 </a:t>
-            </a:r>
-            <a:r>
-              <a:rPr lang="en-US" altLang="ko-KR" dirty="0" smtClean="0"/>
-              <a:t>&amp;</a:t>
-            </a:r>
-            <a:r>
-              <a:rPr lang="ko-KR" altLang="en-US" dirty="0" smtClean="0"/>
-              <a:t> 생성된 </a:t>
-            </a:r>
-            <a:r>
-              <a:rPr lang="en-US" altLang="ko-KR" dirty="0" smtClean="0"/>
-              <a:t>build, firmware </a:t>
-            </a:r>
-            <a:r>
-              <a:rPr lang="ko-KR" altLang="en-US" dirty="0" smtClean="0"/>
-              <a:t>폴더</a:t>
-            </a:r>
-            <a:endParaRPr lang="ko-KR" altLang="en-US" dirty="0"/>
-          </a:p>
-        </p:txBody>
-      </p:sp>
       <p:pic>
         <p:nvPicPr>
-          <p:cNvPr id="4100" name="Picture 4" descr="H:\ESP8266Wifi ModuleSDK\doc\ppt이미지\ESP8266 TCP 서버 만들기\make 성공 화면 &amp; 생성된 build, firmware 폴더.jpg"/>
+          <p:cNvPr id="5122" name="Picture 2" descr="H:\ESP8266Wifi ModuleSDK\doc\ppt이미지\ESP8266 TCP 서버 만들기\프로젝트 폴더 내부.jpg"/>
           <p:cNvPicPr>
-            <a:picLocks noGrp="1" noChangeAspect="1" noChangeArrowheads="1"/>
+            <a:picLocks noChangeAspect="1" noChangeArrowheads="1"/>
           </p:cNvPicPr>
-          <p:nvPr>
-            <p:ph idx="1"/>
-          </p:nvPr>
+          <p:nvPr/>
         </p:nvPicPr>
         <p:blipFill>
           <a:blip r:embed="rId2" cstate="print"/>
@@ -6136,8 +7067,8 @@
         </p:blipFill>
         <p:spPr bwMode="auto">
           <a:xfrm>
-            <a:off x="611560" y="1988840"/>
-            <a:ext cx="8075781" cy="2160240"/>
+            <a:off x="2051720" y="2924944"/>
+            <a:ext cx="5438775" cy="561975"/>
           </a:xfrm>
           <a:prstGeom prst="rect">
             <a:avLst/>
@@ -6145,6 +7076,373 @@
           <a:noFill/>
         </p:spPr>
       </p:pic>
+      <p:pic>
+        <p:nvPicPr>
+          <p:cNvPr id="5123" name="Picture 3" descr="H:\ESP8266Wifi ModuleSDK\doc\ppt이미지\ESP8266 TCP 서버 만들기\user 폴더 내부.jpg"/>
+          <p:cNvPicPr>
+            <a:picLocks noChangeAspect="1" noChangeArrowheads="1"/>
+          </p:cNvPicPr>
+          <p:nvPr/>
+        </p:nvPicPr>
+        <p:blipFill>
+          <a:blip r:embed="rId3" cstate="print"/>
+          <a:srcRect/>
+          <a:stretch>
+            <a:fillRect/>
+          </a:stretch>
+        </p:blipFill>
+        <p:spPr bwMode="auto">
+          <a:xfrm>
+            <a:off x="1907704" y="4437112"/>
+            <a:ext cx="5791200" cy="495300"/>
+          </a:xfrm>
+          <a:prstGeom prst="rect">
+            <a:avLst/>
+          </a:prstGeom>
+          <a:noFill/>
+        </p:spPr>
+      </p:pic>
+      <p:pic>
+        <p:nvPicPr>
+          <p:cNvPr id="5124" name="Picture 4" descr="H:\ESP8266Wifi ModuleSDK\doc\ppt이미지\ESP8266 TCP 서버 만들기\작업폴더 내부.jpg"/>
+          <p:cNvPicPr>
+            <a:picLocks noChangeAspect="1" noChangeArrowheads="1"/>
+          </p:cNvPicPr>
+          <p:nvPr/>
+        </p:nvPicPr>
+        <p:blipFill>
+          <a:blip r:embed="rId4" cstate="print"/>
+          <a:srcRect/>
+          <a:stretch>
+            <a:fillRect/>
+          </a:stretch>
+        </p:blipFill>
+        <p:spPr bwMode="auto">
+          <a:xfrm>
+            <a:off x="2195736" y="1340768"/>
+            <a:ext cx="5124450" cy="571500"/>
+          </a:xfrm>
+          <a:prstGeom prst="rect">
+            <a:avLst/>
+          </a:prstGeom>
+          <a:noFill/>
+        </p:spPr>
+      </p:pic>
+      <p:sp>
+        <p:nvSpPr>
+          <p:cNvPr id="11" name="제목 1"/>
+          <p:cNvSpPr txBox="1">
+            <a:spLocks/>
+          </p:cNvSpPr>
+          <p:nvPr/>
+        </p:nvSpPr>
+        <p:spPr>
+          <a:xfrm>
+            <a:off x="2761456" y="2060848"/>
+            <a:ext cx="3898776" cy="490066"/>
+          </a:xfrm>
+          <a:prstGeom prst="rect">
+            <a:avLst/>
+          </a:prstGeom>
+        </p:spPr>
+        <p:txBody>
+          <a:bodyPr vert="horz" lIns="91440" tIns="45720" rIns="91440" bIns="45720" rtlCol="0" anchor="ctr">
+            <a:normAutofit/>
+          </a:bodyPr>
+          <a:lstStyle/>
+          <a:p>
+            <a:pPr marL="0" marR="0" lvl="0" indent="0" algn="ctr" defTabSz="914400" rtl="0" eaLnBrk="1" fontAlgn="auto" latinLnBrk="1" hangingPunct="1">
+              <a:lnSpc>
+                <a:spcPct val="100000"/>
+              </a:lnSpc>
+              <a:spcBef>
+                <a:spcPct val="0"/>
+              </a:spcBef>
+              <a:spcAft>
+                <a:spcPts val="0"/>
+              </a:spcAft>
+              <a:buClrTx/>
+              <a:buSzTx/>
+              <a:buFontTx/>
+              <a:buNone/>
+              <a:tabLst/>
+              <a:defRPr/>
+            </a:pPr>
+            <a:r>
+              <a:rPr lang="ko-KR" altLang="en-US" dirty="0" smtClean="0">
+                <a:latin typeface="+mj-lt"/>
+                <a:ea typeface="+mj-ea"/>
+                <a:cs typeface="+mj-cs"/>
+              </a:rPr>
+              <a:t>그림 </a:t>
+            </a:r>
+            <a:r>
+              <a:rPr lang="en-US" altLang="ko-KR" dirty="0" smtClean="0">
+                <a:latin typeface="+mj-lt"/>
+                <a:ea typeface="+mj-ea"/>
+                <a:cs typeface="+mj-cs"/>
+              </a:rPr>
+              <a:t>7 </a:t>
+            </a:r>
+            <a:r>
+              <a:rPr lang="ko-KR" altLang="en-US" dirty="0" smtClean="0">
+                <a:latin typeface="+mj-lt"/>
+                <a:ea typeface="+mj-ea"/>
+                <a:cs typeface="+mj-cs"/>
+              </a:rPr>
+              <a:t>작업폴더</a:t>
+            </a:r>
+            <a:r>
+              <a:rPr lang="en-US" altLang="ko-KR" dirty="0" smtClean="0">
+                <a:latin typeface="+mj-lt"/>
+                <a:ea typeface="+mj-ea"/>
+                <a:cs typeface="+mj-cs"/>
+              </a:rPr>
+              <a:t>(</a:t>
+            </a:r>
+            <a:r>
+              <a:rPr lang="en-US" altLang="ko-KR" dirty="0" err="1" smtClean="0">
+                <a:latin typeface="+mj-lt"/>
+                <a:ea typeface="+mj-ea"/>
+                <a:cs typeface="+mj-cs"/>
+              </a:rPr>
+              <a:t>shinwook</a:t>
+            </a:r>
+            <a:r>
+              <a:rPr lang="en-US" altLang="ko-KR" dirty="0" smtClean="0">
+                <a:latin typeface="+mj-lt"/>
+                <a:ea typeface="+mj-ea"/>
+                <a:cs typeface="+mj-cs"/>
+              </a:rPr>
+              <a:t>)</a:t>
+            </a:r>
+            <a:r>
+              <a:rPr lang="ko-KR" altLang="en-US" dirty="0" smtClean="0">
+                <a:latin typeface="+mj-lt"/>
+                <a:ea typeface="+mj-ea"/>
+                <a:cs typeface="+mj-cs"/>
+              </a:rPr>
+              <a:t> 내부</a:t>
+            </a:r>
+            <a:endParaRPr kumimoji="0" lang="ko-KR" altLang="en-US" b="0" i="0" u="none" strike="noStrike" kern="1200" cap="none" spc="0" normalizeH="0" baseline="0" noProof="0" dirty="0">
+              <a:ln>
+                <a:noFill/>
+              </a:ln>
+              <a:solidFill>
+                <a:schemeClr val="tx1"/>
+              </a:solidFill>
+              <a:effectLst/>
+              <a:uLnTx/>
+              <a:uFillTx/>
+              <a:latin typeface="+mj-lt"/>
+              <a:ea typeface="+mj-ea"/>
+              <a:cs typeface="+mj-cs"/>
+            </a:endParaRPr>
+          </a:p>
+        </p:txBody>
+      </p:sp>
+      <p:sp>
+        <p:nvSpPr>
+          <p:cNvPr id="12" name="제목 1"/>
+          <p:cNvSpPr txBox="1">
+            <a:spLocks/>
+          </p:cNvSpPr>
+          <p:nvPr/>
+        </p:nvSpPr>
+        <p:spPr>
+          <a:xfrm>
+            <a:off x="2833464" y="3731022"/>
+            <a:ext cx="3898776" cy="490066"/>
+          </a:xfrm>
+          <a:prstGeom prst="rect">
+            <a:avLst/>
+          </a:prstGeom>
+        </p:spPr>
+        <p:txBody>
+          <a:bodyPr vert="horz" lIns="91440" tIns="45720" rIns="91440" bIns="45720" rtlCol="0" anchor="ctr">
+            <a:normAutofit/>
+          </a:bodyPr>
+          <a:lstStyle/>
+          <a:p>
+            <a:pPr marL="0" marR="0" lvl="0" indent="0" algn="ctr" defTabSz="914400" rtl="0" eaLnBrk="1" fontAlgn="auto" latinLnBrk="1" hangingPunct="1">
+              <a:lnSpc>
+                <a:spcPct val="100000"/>
+              </a:lnSpc>
+              <a:spcBef>
+                <a:spcPct val="0"/>
+              </a:spcBef>
+              <a:spcAft>
+                <a:spcPts val="0"/>
+              </a:spcAft>
+              <a:buClrTx/>
+              <a:buSzTx/>
+              <a:buFontTx/>
+              <a:buNone/>
+              <a:tabLst/>
+              <a:defRPr/>
+            </a:pPr>
+            <a:r>
+              <a:rPr lang="ko-KR" altLang="en-US" dirty="0" smtClean="0">
+                <a:latin typeface="+mj-lt"/>
+                <a:ea typeface="+mj-ea"/>
+                <a:cs typeface="+mj-cs"/>
+              </a:rPr>
+              <a:t>그림 </a:t>
+            </a:r>
+            <a:r>
+              <a:rPr lang="en-US" altLang="ko-KR" dirty="0" smtClean="0">
+                <a:latin typeface="+mj-lt"/>
+                <a:ea typeface="+mj-ea"/>
+                <a:cs typeface="+mj-cs"/>
+              </a:rPr>
+              <a:t>8</a:t>
+            </a:r>
+            <a:r>
+              <a:rPr lang="en-US" altLang="ko-KR" dirty="0" smtClean="0">
+                <a:latin typeface="+mj-lt"/>
+                <a:ea typeface="+mj-ea"/>
+                <a:cs typeface="+mj-cs"/>
+              </a:rPr>
+              <a:t> </a:t>
+            </a:r>
+            <a:r>
+              <a:rPr lang="ko-KR" altLang="en-US" dirty="0" smtClean="0">
+                <a:latin typeface="+mj-lt"/>
+                <a:ea typeface="+mj-ea"/>
+                <a:cs typeface="+mj-cs"/>
+              </a:rPr>
+              <a:t>프로젝트 폴더</a:t>
+            </a:r>
+            <a:r>
+              <a:rPr lang="en-US" altLang="ko-KR" dirty="0" smtClean="0">
+                <a:latin typeface="+mj-lt"/>
+                <a:ea typeface="+mj-ea"/>
+                <a:cs typeface="+mj-cs"/>
+              </a:rPr>
+              <a:t>(</a:t>
+            </a:r>
+            <a:r>
+              <a:rPr lang="en-US" altLang="ko-KR" dirty="0" err="1" smtClean="0">
+                <a:latin typeface="+mj-lt"/>
+                <a:ea typeface="+mj-ea"/>
+                <a:cs typeface="+mj-cs"/>
+              </a:rPr>
+              <a:t>wifiex</a:t>
+            </a:r>
+            <a:r>
+              <a:rPr lang="en-US" altLang="ko-KR" dirty="0" smtClean="0">
+                <a:latin typeface="+mj-lt"/>
+                <a:ea typeface="+mj-ea"/>
+                <a:cs typeface="+mj-cs"/>
+              </a:rPr>
+              <a:t>)</a:t>
+            </a:r>
+            <a:r>
+              <a:rPr lang="ko-KR" altLang="en-US" dirty="0" smtClean="0">
+                <a:latin typeface="+mj-lt"/>
+                <a:ea typeface="+mj-ea"/>
+                <a:cs typeface="+mj-cs"/>
+              </a:rPr>
+              <a:t> 내부</a:t>
+            </a:r>
+            <a:endParaRPr kumimoji="0" lang="ko-KR" altLang="en-US" b="0" i="0" u="none" strike="noStrike" kern="1200" cap="none" spc="0" normalizeH="0" baseline="0" noProof="0" dirty="0">
+              <a:ln>
+                <a:noFill/>
+              </a:ln>
+              <a:solidFill>
+                <a:schemeClr val="tx1"/>
+              </a:solidFill>
+              <a:effectLst/>
+              <a:uLnTx/>
+              <a:uFillTx/>
+              <a:latin typeface="+mj-lt"/>
+              <a:ea typeface="+mj-ea"/>
+              <a:cs typeface="+mj-cs"/>
+            </a:endParaRPr>
+          </a:p>
+        </p:txBody>
+      </p:sp>
+      <p:sp>
+        <p:nvSpPr>
+          <p:cNvPr id="13" name="제목 1"/>
+          <p:cNvSpPr txBox="1">
+            <a:spLocks/>
+          </p:cNvSpPr>
+          <p:nvPr/>
+        </p:nvSpPr>
+        <p:spPr>
+          <a:xfrm>
+            <a:off x="2708176" y="5171182"/>
+            <a:ext cx="3898776" cy="490066"/>
+          </a:xfrm>
+          <a:prstGeom prst="rect">
+            <a:avLst/>
+          </a:prstGeom>
+        </p:spPr>
+        <p:txBody>
+          <a:bodyPr vert="horz" lIns="91440" tIns="45720" rIns="91440" bIns="45720" rtlCol="0" anchor="ctr">
+            <a:normAutofit/>
+          </a:bodyPr>
+          <a:lstStyle/>
+          <a:p>
+            <a:pPr marL="0" marR="0" lvl="0" indent="0" algn="ctr" defTabSz="914400" rtl="0" eaLnBrk="1" fontAlgn="auto" latinLnBrk="1" hangingPunct="1">
+              <a:lnSpc>
+                <a:spcPct val="100000"/>
+              </a:lnSpc>
+              <a:spcBef>
+                <a:spcPct val="0"/>
+              </a:spcBef>
+              <a:spcAft>
+                <a:spcPts val="0"/>
+              </a:spcAft>
+              <a:buClrTx/>
+              <a:buSzTx/>
+              <a:buFontTx/>
+              <a:buNone/>
+              <a:tabLst/>
+              <a:defRPr/>
+            </a:pPr>
+            <a:r>
+              <a:rPr lang="ko-KR" altLang="en-US" dirty="0" smtClean="0">
+                <a:latin typeface="+mj-lt"/>
+                <a:ea typeface="+mj-ea"/>
+                <a:cs typeface="+mj-cs"/>
+              </a:rPr>
+              <a:t>그림 </a:t>
+            </a:r>
+            <a:r>
+              <a:rPr lang="en-US" altLang="ko-KR" dirty="0" smtClean="0">
+                <a:latin typeface="+mj-lt"/>
+                <a:ea typeface="+mj-ea"/>
+                <a:cs typeface="+mj-cs"/>
+              </a:rPr>
+              <a:t>9 user </a:t>
+            </a:r>
+            <a:r>
+              <a:rPr lang="ko-KR" altLang="en-US" dirty="0" smtClean="0">
+                <a:latin typeface="+mj-lt"/>
+                <a:ea typeface="+mj-ea"/>
+                <a:cs typeface="+mj-cs"/>
+              </a:rPr>
+              <a:t>폴더 내부</a:t>
+            </a:r>
+            <a:endParaRPr kumimoji="0" lang="ko-KR" altLang="en-US" b="0" i="0" u="none" strike="noStrike" kern="1200" cap="none" spc="0" normalizeH="0" baseline="0" noProof="0" dirty="0">
+              <a:ln>
+                <a:noFill/>
+              </a:ln>
+              <a:solidFill>
+                <a:schemeClr val="tx1"/>
+              </a:solidFill>
+              <a:effectLst/>
+              <a:uLnTx/>
+              <a:uFillTx/>
+              <a:latin typeface="+mj-lt"/>
+              <a:ea typeface="+mj-ea"/>
+              <a:cs typeface="+mj-cs"/>
+            </a:endParaRPr>
+          </a:p>
+        </p:txBody>
+      </p:sp>
     </p:spTree>
   </p:cSld>
   <p:clrMapOvr>
@@ -6172,466 +7470,43 @@
       </p:grpSpPr>
       <p:sp>
         <p:nvSpPr>
-          <p:cNvPr id="2" name="제목 1"/>
+          <p:cNvPr id="6" name="제목 1"/>
           <p:cNvSpPr>
             <a:spLocks noGrp="1"/>
           </p:cNvSpPr>
           <p:nvPr>
             <p:ph type="title"/>
-          </p:nvPr>
-        </p:nvSpPr>
-        <p:spPr/>
-        <p:txBody>
-          <a:bodyPr/>
-          <a:lstStyle/>
-          <a:p>
-            <a:r>
-              <a:rPr lang="ko-KR" altLang="en-US" dirty="0" smtClean="0"/>
-              <a:t>업로</a:t>
-            </a:r>
-            <a:r>
-              <a:rPr lang="ko-KR" altLang="en-US" dirty="0" smtClean="0"/>
-              <a:t>드</a:t>
-            </a:r>
-            <a:endParaRPr lang="ko-KR" altLang="en-US" dirty="0"/>
-          </a:p>
-        </p:txBody>
-      </p:sp>
-      <p:sp>
-        <p:nvSpPr>
-          <p:cNvPr id="3" name="내용 개체 틀 2"/>
-          <p:cNvSpPr>
-            <a:spLocks noGrp="1"/>
-          </p:cNvSpPr>
-          <p:nvPr>
-            <p:ph idx="1"/>
           </p:nvPr>
         </p:nvSpPr>
         <p:spPr>
           <a:xfrm>
-            <a:off x="457200" y="1600201"/>
-            <a:ext cx="8229600" cy="4493096"/>
+            <a:off x="4561656" y="274638"/>
+            <a:ext cx="4114800" cy="490066"/>
           </a:xfrm>
         </p:spPr>
         <p:txBody>
           <a:bodyPr>
-            <a:normAutofit lnSpcReduction="10000"/>
+            <a:normAutofit/>
           </a:bodyPr>
           <a:lstStyle/>
           <a:p>
-            <a:pPr>
-              <a:buAutoNum type="arabicPeriod"/>
-            </a:pPr>
-            <a:r>
-              <a:rPr lang="en-US" altLang="ko-KR" sz="1800" dirty="0" smtClean="0"/>
+            <a:r>
+              <a:rPr lang="en-US" altLang="ko-KR" dirty="0" smtClean="0"/>
               <a:t>ESP8266</a:t>
             </a:r>
             <a:r>
-              <a:rPr lang="ko-KR" altLang="en-US" sz="1800" dirty="0" smtClean="0"/>
-              <a:t>모듈을 개발보드에 장착시킨다</a:t>
-            </a:r>
-            <a:r>
-              <a:rPr lang="en-US" altLang="ko-KR" sz="1800" dirty="0" smtClean="0"/>
-              <a:t>.</a:t>
-            </a:r>
-          </a:p>
-          <a:p>
-            <a:pPr>
-              <a:buAutoNum type="arabicPeriod"/>
-            </a:pPr>
-            <a:r>
-              <a:rPr lang="en-US" altLang="ko-KR" sz="1800" dirty="0" smtClean="0"/>
-              <a:t>GPIO0</a:t>
-            </a:r>
-            <a:r>
-              <a:rPr lang="ko-KR" altLang="en-US" sz="1800" dirty="0" smtClean="0"/>
-              <a:t>을 </a:t>
-            </a:r>
-            <a:r>
-              <a:rPr lang="en-US" altLang="ko-KR" sz="1800" dirty="0" smtClean="0"/>
-              <a:t>GND</a:t>
-            </a:r>
-            <a:r>
-              <a:rPr lang="ko-KR" altLang="en-US" sz="1800" dirty="0" smtClean="0"/>
-              <a:t>에 연결한다</a:t>
-            </a:r>
-            <a:r>
-              <a:rPr lang="en-US" altLang="ko-KR" sz="1800" dirty="0" smtClean="0"/>
-              <a:t>.</a:t>
-            </a:r>
-          </a:p>
-          <a:p>
-            <a:pPr>
-              <a:buAutoNum type="arabicPeriod"/>
-            </a:pPr>
-            <a:r>
-              <a:rPr lang="en-US" altLang="ko-KR" sz="1800" dirty="0" smtClean="0"/>
-              <a:t>ESP-201</a:t>
-            </a:r>
-            <a:r>
-              <a:rPr lang="ko-KR" altLang="en-US" sz="1800" dirty="0" smtClean="0"/>
-              <a:t>개발보드의 전원을 끈다</a:t>
-            </a:r>
-            <a:r>
-              <a:rPr lang="en-US" altLang="ko-KR" sz="1800" dirty="0" smtClean="0"/>
-              <a:t>.</a:t>
-            </a:r>
-          </a:p>
-          <a:p>
-            <a:pPr>
-              <a:buAutoNum type="arabicPeriod"/>
-            </a:pPr>
-            <a:r>
-              <a:rPr lang="en-US" altLang="ko-KR" sz="1800" dirty="0" smtClean="0"/>
-              <a:t>K1 </a:t>
-            </a:r>
-            <a:r>
-              <a:rPr lang="ko-KR" altLang="en-US" sz="1800" dirty="0" err="1" smtClean="0"/>
-              <a:t>딥스위치</a:t>
-            </a:r>
-            <a:r>
-              <a:rPr lang="ko-KR" altLang="en-US" sz="1800" dirty="0" smtClean="0"/>
-              <a:t> 버튼을 </a:t>
-            </a:r>
-            <a:r>
-              <a:rPr lang="en-US" altLang="ko-KR" sz="1800" dirty="0" smtClean="0"/>
-              <a:t>on</a:t>
-            </a:r>
-            <a:r>
-              <a:rPr lang="ko-KR" altLang="en-US" sz="1800" dirty="0" smtClean="0"/>
-              <a:t>하고 개발 보드의 전원을 켠다</a:t>
-            </a:r>
-            <a:r>
-              <a:rPr lang="en-US" altLang="ko-KR" sz="1800" dirty="0" smtClean="0"/>
-              <a:t>.</a:t>
-            </a:r>
-          </a:p>
-          <a:p>
-            <a:pPr>
-              <a:buAutoNum type="arabicPeriod"/>
-            </a:pPr>
-            <a:r>
-              <a:rPr lang="en-US" altLang="ko-KR" sz="1800" dirty="0" smtClean="0"/>
-              <a:t>K1 </a:t>
-            </a:r>
-            <a:r>
-              <a:rPr lang="ko-KR" altLang="en-US" sz="1800" dirty="0" err="1" smtClean="0"/>
-              <a:t>딥스위치</a:t>
-            </a:r>
-            <a:r>
-              <a:rPr lang="ko-KR" altLang="en-US" sz="1800" dirty="0" smtClean="0"/>
-              <a:t> 버튼을 </a:t>
-            </a:r>
-            <a:r>
-              <a:rPr lang="en-US" altLang="ko-KR" sz="1800" dirty="0" smtClean="0"/>
-              <a:t>off</a:t>
-            </a:r>
-            <a:r>
-              <a:rPr lang="ko-KR" altLang="en-US" sz="1800" dirty="0" smtClean="0"/>
-              <a:t>한다</a:t>
-            </a:r>
-            <a:r>
-              <a:rPr lang="en-US" altLang="ko-KR" sz="1800" dirty="0" smtClean="0"/>
-              <a:t>.</a:t>
-            </a:r>
-          </a:p>
-          <a:p>
-            <a:pPr>
-              <a:buAutoNum type="arabicPeriod"/>
-            </a:pPr>
-            <a:r>
-              <a:rPr lang="ko-KR" altLang="en-US" sz="1800" dirty="0" smtClean="0"/>
-              <a:t>아래의 명령어를 이용하여 </a:t>
-            </a:r>
-            <a:r>
-              <a:rPr lang="ko-KR" altLang="en-US" sz="1800" dirty="0" err="1" smtClean="0"/>
-              <a:t>펌웨어를</a:t>
-            </a:r>
-            <a:r>
-              <a:rPr lang="ko-KR" altLang="en-US" sz="1800" dirty="0" smtClean="0"/>
-              <a:t> </a:t>
-            </a:r>
-            <a:r>
-              <a:rPr lang="ko-KR" altLang="en-US" sz="1800" dirty="0" err="1" smtClean="0"/>
-              <a:t>업로드한다</a:t>
-            </a:r>
-            <a:r>
-              <a:rPr lang="en-US" altLang="ko-KR" sz="1800" dirty="0" smtClean="0"/>
-              <a:t>. </a:t>
-            </a:r>
-          </a:p>
-          <a:p>
-            <a:pPr>
-              <a:buNone/>
-            </a:pPr>
-            <a:endParaRPr lang="en-US" altLang="ko-KR" sz="1800" dirty="0" smtClean="0"/>
-          </a:p>
-          <a:p>
-            <a:pPr>
-              <a:buNone/>
-            </a:pPr>
-            <a:r>
-              <a:rPr lang="en-US" altLang="ko-KR" sz="1500" dirty="0" smtClean="0"/>
-              <a:t>#</a:t>
-            </a:r>
-            <a:r>
-              <a:rPr lang="en-US" altLang="ko-KR" sz="1500" dirty="0" smtClean="0"/>
-              <a:t> [</a:t>
-            </a:r>
-            <a:r>
-              <a:rPr lang="en-US" altLang="ko-KR" sz="1500" dirty="0" err="1" smtClean="0"/>
-              <a:t>sudo</a:t>
-            </a:r>
-            <a:r>
-              <a:rPr lang="en-US" altLang="ko-KR" sz="1500" dirty="0" smtClean="0"/>
-              <a:t> /opt/</a:t>
-            </a:r>
-            <a:r>
-              <a:rPr lang="en-US" altLang="ko-KR" sz="1500" dirty="0" err="1" smtClean="0"/>
-              <a:t>Espressif</a:t>
-            </a:r>
-            <a:r>
-              <a:rPr lang="en-US" altLang="ko-KR" sz="1500" dirty="0" smtClean="0"/>
-              <a:t>/</a:t>
-            </a:r>
-            <a:r>
-              <a:rPr lang="en-US" altLang="ko-KR" sz="1500" dirty="0" err="1" smtClean="0"/>
-              <a:t>esptool-py</a:t>
-            </a:r>
-            <a:r>
-              <a:rPr lang="en-US" altLang="ko-KR" sz="1500" dirty="0" smtClean="0"/>
-              <a:t>/esptool.py --port /dev/ttyUSB0 </a:t>
-            </a:r>
-            <a:r>
-              <a:rPr lang="en-US" altLang="ko-KR" sz="1500" dirty="0" err="1" smtClean="0"/>
-              <a:t>write_flash</a:t>
-            </a:r>
-            <a:r>
-              <a:rPr lang="en-US" altLang="ko-KR" sz="1500" dirty="0" smtClean="0"/>
-              <a:t> 0x3C000 /opt/</a:t>
-            </a:r>
-            <a:r>
-              <a:rPr lang="en-US" altLang="ko-KR" sz="1500" dirty="0" err="1" smtClean="0"/>
-              <a:t>Espressif</a:t>
-            </a:r>
-            <a:r>
-              <a:rPr lang="en-US" altLang="ko-KR" sz="1500" dirty="0" smtClean="0"/>
-              <a:t>/ESP8266_SDK/bin/blank.bin 0x00000 /opt/</a:t>
-            </a:r>
-            <a:r>
-              <a:rPr lang="en-US" altLang="ko-KR" sz="1500" dirty="0" err="1" smtClean="0"/>
-              <a:t>Espressif</a:t>
-            </a:r>
-            <a:r>
-              <a:rPr lang="en-US" altLang="ko-KR" sz="1500" dirty="0" smtClean="0"/>
-              <a:t>/ESP8266_SDK/</a:t>
-            </a:r>
-            <a:r>
-              <a:rPr lang="en-US" altLang="ko-KR" sz="1500" dirty="0" err="1" smtClean="0"/>
-              <a:t>shinwook</a:t>
-            </a:r>
-            <a:r>
-              <a:rPr lang="en-US" altLang="ko-KR" sz="1500" dirty="0" smtClean="0"/>
-              <a:t>(</a:t>
-            </a:r>
-            <a:r>
-              <a:rPr lang="ko-KR" altLang="en-US" sz="1500" dirty="0" smtClean="0"/>
-              <a:t>내 작업환경</a:t>
-            </a:r>
-            <a:r>
-              <a:rPr lang="en-US" altLang="ko-KR" sz="1500" dirty="0" smtClean="0"/>
-              <a:t>)/</a:t>
-            </a:r>
-            <a:r>
-              <a:rPr lang="en-US" altLang="ko-KR" sz="1500" dirty="0" err="1" smtClean="0"/>
-              <a:t>wifiex</a:t>
-            </a:r>
-            <a:r>
-              <a:rPr lang="en-US" altLang="ko-KR" sz="1500" dirty="0" smtClean="0"/>
-              <a:t>(</a:t>
-            </a:r>
-            <a:r>
-              <a:rPr lang="ko-KR" altLang="en-US" sz="1500" dirty="0" err="1" smtClean="0"/>
-              <a:t>프로젝트명</a:t>
-            </a:r>
-            <a:r>
-              <a:rPr lang="en-US" altLang="ko-KR" sz="1500" dirty="0" smtClean="0"/>
-              <a:t>)/firmware/0x00000.bin 0x40000 /opt/</a:t>
-            </a:r>
-            <a:r>
-              <a:rPr lang="en-US" altLang="ko-KR" sz="1500" dirty="0" err="1" smtClean="0"/>
-              <a:t>Espressif</a:t>
-            </a:r>
-            <a:r>
-              <a:rPr lang="en-US" altLang="ko-KR" sz="1500" dirty="0" smtClean="0"/>
-              <a:t>/ESP8266_SDK opt/</a:t>
-            </a:r>
-            <a:r>
-              <a:rPr lang="en-US" altLang="ko-KR" sz="1500" dirty="0" err="1" smtClean="0"/>
-              <a:t>Espressif</a:t>
-            </a:r>
-            <a:r>
-              <a:rPr lang="en-US" altLang="ko-KR" sz="1500" dirty="0" smtClean="0"/>
-              <a:t>/ESP8266_SDK/</a:t>
-            </a:r>
-            <a:r>
-              <a:rPr lang="en-US" altLang="ko-KR" sz="1500" dirty="0" err="1" smtClean="0"/>
-              <a:t>shinwook</a:t>
-            </a:r>
-            <a:r>
-              <a:rPr lang="en-US" altLang="ko-KR" sz="1500" dirty="0" smtClean="0"/>
-              <a:t>(</a:t>
-            </a:r>
-            <a:r>
-              <a:rPr lang="ko-KR" altLang="en-US" sz="1500" dirty="0" smtClean="0"/>
-              <a:t>내 작업환경</a:t>
-            </a:r>
-            <a:r>
-              <a:rPr lang="en-US" altLang="ko-KR" sz="1500" dirty="0" smtClean="0"/>
-              <a:t>)/</a:t>
-            </a:r>
-            <a:r>
-              <a:rPr lang="en-US" altLang="ko-KR" sz="1500" dirty="0" err="1" smtClean="0"/>
-              <a:t>wifiex</a:t>
-            </a:r>
-            <a:r>
-              <a:rPr lang="en-US" altLang="ko-KR" sz="1500" dirty="0" smtClean="0"/>
-              <a:t>(</a:t>
-            </a:r>
-            <a:r>
-              <a:rPr lang="ko-KR" altLang="en-US" sz="1500" dirty="0" err="1" smtClean="0"/>
-              <a:t>프로젝트명</a:t>
-            </a:r>
-            <a:r>
-              <a:rPr lang="en-US" altLang="ko-KR" sz="1500" dirty="0" smtClean="0"/>
-              <a:t>)/ firmware/0x40000.bin</a:t>
-            </a:r>
-            <a:r>
-              <a:rPr lang="en-US" altLang="ko-KR" sz="1500" dirty="0" smtClean="0"/>
-              <a:t>]</a:t>
-            </a:r>
-          </a:p>
-          <a:p>
-            <a:pPr>
-              <a:buNone/>
-            </a:pPr>
-            <a:r>
-              <a:rPr lang="en-US" altLang="ko-KR" sz="1500" dirty="0" smtClean="0"/>
-              <a:t># </a:t>
-            </a:r>
-            <a:r>
-              <a:rPr lang="ko-KR" altLang="en-US" sz="1500" dirty="0" smtClean="0"/>
-              <a:t>또는 </a:t>
-            </a:r>
-            <a:r>
-              <a:rPr lang="en-US" altLang="ko-KR" sz="1500" dirty="0" smtClean="0"/>
-              <a:t>“</a:t>
-            </a:r>
-            <a:r>
-              <a:rPr lang="en-US" altLang="ko-KR" sz="1500" dirty="0" err="1" smtClean="0"/>
-              <a:t>burnEsp</a:t>
-            </a:r>
-            <a:r>
-              <a:rPr lang="en-US" altLang="ko-KR" sz="1500" dirty="0" smtClean="0"/>
-              <a:t>” </a:t>
-            </a:r>
-            <a:r>
-              <a:rPr lang="ko-KR" altLang="en-US" sz="1500" dirty="0" smtClean="0"/>
-              <a:t>라는 이름의 파일을 만들고 그 안에 위의 명령어를 집어 넣은 뒤 </a:t>
-            </a:r>
-            <a:r>
-              <a:rPr lang="en-US" altLang="ko-KR" sz="1500" dirty="0" smtClean="0"/>
-              <a:t>[./</a:t>
-            </a:r>
-            <a:r>
-              <a:rPr lang="en-US" altLang="ko-KR" sz="1500" dirty="0" err="1" smtClean="0"/>
-              <a:t>burnEsp</a:t>
-            </a:r>
-            <a:r>
-              <a:rPr lang="en-US" altLang="ko-KR" sz="1500" dirty="0" smtClean="0"/>
-              <a:t>] </a:t>
-            </a:r>
-            <a:r>
-              <a:rPr lang="ko-KR" altLang="en-US" sz="1500" dirty="0" smtClean="0"/>
-              <a:t>명령어를 타이핑하면 </a:t>
-            </a:r>
-            <a:r>
-              <a:rPr lang="ko-KR" altLang="en-US" sz="1500" dirty="0" err="1" smtClean="0"/>
-              <a:t>펌웨어</a:t>
-            </a:r>
-            <a:r>
-              <a:rPr lang="ko-KR" altLang="en-US" sz="1500" dirty="0" smtClean="0"/>
-              <a:t> 업로드가 시작된다</a:t>
-            </a:r>
-            <a:r>
-              <a:rPr lang="en-US" altLang="ko-KR" sz="1500" dirty="0" smtClean="0"/>
-              <a:t>. </a:t>
-            </a:r>
-            <a:r>
-              <a:rPr lang="ko-KR" altLang="en-US" sz="1500" dirty="0" smtClean="0"/>
-              <a:t>이 방법을 권장한다</a:t>
-            </a:r>
-            <a:r>
-              <a:rPr lang="en-US" altLang="ko-KR" sz="1500" dirty="0" smtClean="0"/>
-              <a:t>. </a:t>
-            </a:r>
-            <a:r>
-              <a:rPr lang="ko-KR" altLang="en-US" sz="1500" dirty="0" smtClean="0"/>
-              <a:t>다음 </a:t>
-            </a:r>
-            <a:r>
-              <a:rPr lang="ko-KR" altLang="en-US" sz="1500" dirty="0" err="1" smtClean="0"/>
-              <a:t>프로젝트때</a:t>
-            </a:r>
-            <a:r>
-              <a:rPr lang="ko-KR" altLang="en-US" sz="1500" dirty="0" smtClean="0"/>
-              <a:t> 이 파일을 복사하고 위 명령어의 </a:t>
-            </a:r>
-            <a:r>
-              <a:rPr lang="en-US" altLang="ko-KR" sz="1500" dirty="0" smtClean="0"/>
-              <a:t>‘</a:t>
-            </a:r>
-            <a:r>
-              <a:rPr lang="ko-KR" altLang="en-US" sz="1500" dirty="0" err="1" smtClean="0"/>
-              <a:t>프로젝트명</a:t>
-            </a:r>
-            <a:r>
-              <a:rPr lang="en-US" altLang="ko-KR" sz="1500" dirty="0" smtClean="0"/>
-              <a:t>’ </a:t>
-            </a:r>
-            <a:r>
-              <a:rPr lang="ko-KR" altLang="en-US" sz="1500" dirty="0" smtClean="0"/>
-              <a:t>부분만 바꿔주면 된다</a:t>
-            </a:r>
-            <a:r>
-              <a:rPr lang="en-US" altLang="ko-KR" sz="1500" dirty="0" smtClean="0"/>
-              <a:t>. </a:t>
-            </a:r>
-            <a:r>
-              <a:rPr lang="ko-KR" altLang="en-US" sz="1500" dirty="0" smtClean="0"/>
-              <a:t>작업환경이 바뀌면 </a:t>
-            </a:r>
-            <a:r>
-              <a:rPr lang="en-US" altLang="ko-KR" sz="1500" dirty="0" smtClean="0"/>
-              <a:t>‘</a:t>
-            </a:r>
-            <a:r>
-              <a:rPr lang="ko-KR" altLang="en-US" sz="1500" dirty="0" smtClean="0"/>
-              <a:t>내 작업환경</a:t>
-            </a:r>
-            <a:r>
-              <a:rPr lang="en-US" altLang="ko-KR" sz="1500" dirty="0" smtClean="0"/>
-              <a:t>’ </a:t>
-            </a:r>
-            <a:r>
-              <a:rPr lang="ko-KR" altLang="en-US" sz="1500" dirty="0" smtClean="0"/>
-              <a:t>부분도 같이 바꿔 주어야 한다</a:t>
-            </a:r>
-            <a:r>
-              <a:rPr lang="en-US" altLang="ko-KR" sz="1500" dirty="0" smtClean="0"/>
-              <a:t>.</a:t>
-            </a:r>
-            <a:endParaRPr lang="ko-KR" altLang="en-US" sz="1500" dirty="0"/>
+              <a:rPr lang="ko-KR" altLang="en-US" dirty="0" smtClean="0"/>
+              <a:t>으로 </a:t>
+            </a:r>
+            <a:r>
+              <a:rPr lang="en-US" altLang="ko-KR" dirty="0" smtClean="0"/>
+              <a:t>TCP </a:t>
+            </a:r>
+            <a:r>
+              <a:rPr lang="ko-KR" altLang="en-US" dirty="0" smtClean="0"/>
+              <a:t>서버 만들기</a:t>
+            </a:r>
+            <a:endParaRPr lang="ko-KR" altLang="en-US" dirty="0"/>
           </a:p>
         </p:txBody>
       </p:sp>
@@ -6656,6 +7531,39 @@
               <a:t>9</a:t>
             </a:fld>
             <a:endParaRPr lang="ko-KR" altLang="en-US"/>
+          </a:p>
+        </p:txBody>
+      </p:sp>
+      <p:sp>
+        <p:nvSpPr>
+          <p:cNvPr id="8" name="내용 개체 틀 7"/>
+          <p:cNvSpPr>
+            <a:spLocks noGrp="1"/>
+          </p:cNvSpPr>
+          <p:nvPr>
+            <p:ph idx="1"/>
+          </p:nvPr>
+        </p:nvSpPr>
+        <p:spPr>
+          <a:xfrm>
+            <a:off x="467544" y="2996952"/>
+            <a:ext cx="8229600" cy="936104"/>
+          </a:xfrm>
+        </p:spPr>
+        <p:txBody>
+          <a:bodyPr/>
+          <a:lstStyle/>
+          <a:p>
+            <a:pPr algn="ctr"/>
+            <a:r>
+              <a:rPr lang="en-US" altLang="ko-KR" dirty="0" smtClean="0"/>
+              <a:t>ESP8266 TCP </a:t>
+            </a:r>
+            <a:r>
+              <a:rPr lang="ko-KR" altLang="en-US" dirty="0" smtClean="0"/>
+              <a:t>서버 코드 그림</a:t>
+            </a:r>
+            <a:endParaRPr lang="ko-KR" altLang="en-US" dirty="0"/>
           </a:p>
         </p:txBody>
       </p:sp>

</xml_diff>